<commit_message>
update file presentation and mslists query
</commit_message>
<xml_diff>
--- a/GoogleDriveScriptData/GoogleDriveQuery.pptx
+++ b/GoogleDriveScriptData/GoogleDriveQuery.pptx
@@ -1065,7 +1065,7 @@
               <a:defRPr/>
             </a:pPr>
             <a:r>
-              <a:rPr lang="en-US"/>
+              <a:rPr lang="en-US" dirty="0"/>
               <a:t>Select Product of login User</a:t>
             </a:r>
           </a:p>
@@ -1471,6 +1471,33 @@
             <a:r>
               <a:rPr lang="en-US" dirty="0"/>
               <a:t>Select File/Folder. Which have been shared to Login User</a:t>
+            </a:r>
+          </a:p>
+          <a:p>
+            <a:r>
+              <a:rPr lang="en-US" dirty="0"/>
+              <a:t>Sort by </a:t>
+            </a:r>
+            <a:r>
+              <a:rPr lang="en-US" dirty="0" err="1"/>
+              <a:t>FileType</a:t>
+            </a:r>
+            <a:endParaRPr lang="en-US" dirty="0"/>
+          </a:p>
+          <a:p>
+            <a:r>
+              <a:rPr lang="en-US" dirty="0"/>
+              <a:t>Sort by Owner</a:t>
+            </a:r>
+          </a:p>
+          <a:p>
+            <a:r>
+              <a:rPr lang="en-US" dirty="0"/>
+              <a:t>Sort </a:t>
+            </a:r>
+            <a:r>
+              <a:rPr lang="en-US"/>
+              <a:t>by Action Recent</a:t>
             </a:r>
           </a:p>
         </p:txBody>
@@ -11440,6 +11467,405 @@
           </a:fontRef>
         </p:style>
       </p:cxnSp>
+      <p:sp>
+        <p:nvSpPr>
+          <p:cNvPr id="2" name="Rectangle: Rounded Corners 1">
+            <a:extLst>
+              <a:ext uri="{FF2B5EF4-FFF2-40B4-BE49-F238E27FC236}">
+                <a16:creationId xmlns:a16="http://schemas.microsoft.com/office/drawing/2014/main" id="{9B0384E4-DBAE-F759-3E89-B423AFB0935E}"/>
+              </a:ext>
+            </a:extLst>
+          </p:cNvPr>
+          <p:cNvSpPr/>
+          <p:nvPr/>
+        </p:nvSpPr>
+        <p:spPr>
+          <a:xfrm>
+            <a:off x="3579223" y="2063931"/>
+            <a:ext cx="4833257" cy="561703"/>
+          </a:xfrm>
+          <a:prstGeom prst="roundRect">
+            <a:avLst/>
+          </a:prstGeom>
+          <a:noFill/>
+          <a:ln>
+            <a:solidFill>
+              <a:srgbClr val="FF0000"/>
+            </a:solidFill>
+          </a:ln>
+        </p:spPr>
+        <p:style>
+          <a:lnRef idx="2">
+            <a:schemeClr val="accent1">
+              <a:shade val="15000"/>
+            </a:schemeClr>
+          </a:lnRef>
+          <a:fillRef idx="1">
+            <a:schemeClr val="accent1"/>
+          </a:fillRef>
+          <a:effectRef idx="0">
+            <a:schemeClr val="accent1"/>
+          </a:effectRef>
+          <a:fontRef idx="minor">
+            <a:schemeClr val="lt1"/>
+          </a:fontRef>
+        </p:style>
+        <p:txBody>
+          <a:bodyPr rtlCol="0" anchor="ctr"/>
+          <a:lstStyle/>
+          <a:p>
+            <a:pPr algn="ctr"/>
+            <a:endParaRPr lang="en-US"/>
+          </a:p>
+        </p:txBody>
+      </p:sp>
+      <p:sp>
+        <p:nvSpPr>
+          <p:cNvPr id="3" name="TextBox 2">
+            <a:extLst>
+              <a:ext uri="{FF2B5EF4-FFF2-40B4-BE49-F238E27FC236}">
+                <a16:creationId xmlns:a16="http://schemas.microsoft.com/office/drawing/2014/main" id="{A12AC991-DD84-B191-6A68-0F42D566A53D}"/>
+              </a:ext>
+            </a:extLst>
+          </p:cNvPr>
+          <p:cNvSpPr txBox="1"/>
+          <p:nvPr/>
+        </p:nvSpPr>
+        <p:spPr>
+          <a:xfrm>
+            <a:off x="6122126" y="1359225"/>
+            <a:ext cx="2290354" cy="307777"/>
+          </a:xfrm>
+          <a:prstGeom prst="rect">
+            <a:avLst/>
+          </a:prstGeom>
+          <a:solidFill>
+            <a:srgbClr val="FFFF00"/>
+          </a:solidFill>
+        </p:spPr>
+        <p:txBody>
+          <a:bodyPr wrap="square" rtlCol="0">
+            <a:spAutoFit/>
+          </a:bodyPr>
+          <a:lstStyle/>
+          <a:p>
+            <a:pPr algn="ctr"/>
+            <a:r>
+              <a:rPr lang="en-US" dirty="0"/>
+              <a:t>Email</a:t>
+            </a:r>
+          </a:p>
+        </p:txBody>
+      </p:sp>
+      <p:cxnSp>
+        <p:nvCxnSpPr>
+          <p:cNvPr id="8" name="Connector: Curved 7">
+            <a:extLst>
+              <a:ext uri="{FF2B5EF4-FFF2-40B4-BE49-F238E27FC236}">
+                <a16:creationId xmlns:a16="http://schemas.microsoft.com/office/drawing/2014/main" id="{37263FDF-C31E-CA50-2566-0AA790724626}"/>
+              </a:ext>
+            </a:extLst>
+          </p:cNvPr>
+          <p:cNvCxnSpPr>
+            <a:cxnSpLocks/>
+            <a:stCxn id="3" idx="2"/>
+            <a:endCxn id="2" idx="0"/>
+          </p:cNvCxnSpPr>
+          <p:nvPr/>
+        </p:nvCxnSpPr>
+        <p:spPr>
+          <a:xfrm rot="5400000">
+            <a:off x="6433114" y="1229741"/>
+            <a:ext cx="396929" cy="1271451"/>
+          </a:xfrm>
+          <a:prstGeom prst="curvedConnector3">
+            <a:avLst>
+              <a:gd name="adj1" fmla="val 50000"/>
+            </a:avLst>
+          </a:prstGeom>
+          <a:ln>
+            <a:tailEnd type="triangle"/>
+          </a:ln>
+        </p:spPr>
+        <p:style>
+          <a:lnRef idx="2">
+            <a:schemeClr val="dk1"/>
+          </a:lnRef>
+          <a:fillRef idx="0">
+            <a:schemeClr val="dk1"/>
+          </a:fillRef>
+          <a:effectRef idx="1">
+            <a:schemeClr val="dk1"/>
+          </a:effectRef>
+          <a:fontRef idx="minor">
+            <a:schemeClr val="tx1"/>
+          </a:fontRef>
+        </p:style>
+      </p:cxnSp>
+      <p:sp>
+        <p:nvSpPr>
+          <p:cNvPr id="13" name="Flowchart: Connector 12">
+            <a:extLst>
+              <a:ext uri="{FF2B5EF4-FFF2-40B4-BE49-F238E27FC236}">
+                <a16:creationId xmlns:a16="http://schemas.microsoft.com/office/drawing/2014/main" id="{E757EF00-2DAF-F85A-FD0B-7F25B3D5752E}"/>
+              </a:ext>
+            </a:extLst>
+          </p:cNvPr>
+          <p:cNvSpPr/>
+          <p:nvPr/>
+        </p:nvSpPr>
+        <p:spPr>
+          <a:xfrm>
+            <a:off x="5172891" y="2978331"/>
+            <a:ext cx="1619795" cy="1632858"/>
+          </a:xfrm>
+          <a:prstGeom prst="flowChartConnector">
+            <a:avLst/>
+          </a:prstGeom>
+          <a:noFill/>
+          <a:ln>
+            <a:solidFill>
+              <a:srgbClr val="FFFF00"/>
+            </a:solidFill>
+          </a:ln>
+        </p:spPr>
+        <p:style>
+          <a:lnRef idx="2">
+            <a:schemeClr val="accent1">
+              <a:shade val="15000"/>
+            </a:schemeClr>
+          </a:lnRef>
+          <a:fillRef idx="1">
+            <a:schemeClr val="accent1"/>
+          </a:fillRef>
+          <a:effectRef idx="0">
+            <a:schemeClr val="accent1"/>
+          </a:effectRef>
+          <a:fontRef idx="minor">
+            <a:schemeClr val="lt1"/>
+          </a:fontRef>
+        </p:style>
+        <p:txBody>
+          <a:bodyPr rtlCol="0" anchor="ctr"/>
+          <a:lstStyle/>
+          <a:p>
+            <a:pPr algn="ctr"/>
+            <a:endParaRPr lang="en-US"/>
+          </a:p>
+        </p:txBody>
+      </p:sp>
+      <p:sp>
+        <p:nvSpPr>
+          <p:cNvPr id="14" name="TextBox 13">
+            <a:extLst>
+              <a:ext uri="{FF2B5EF4-FFF2-40B4-BE49-F238E27FC236}">
+                <a16:creationId xmlns:a16="http://schemas.microsoft.com/office/drawing/2014/main" id="{EB027523-DABE-EB5E-E031-D6708C393DCB}"/>
+              </a:ext>
+            </a:extLst>
+          </p:cNvPr>
+          <p:cNvSpPr txBox="1"/>
+          <p:nvPr/>
+        </p:nvSpPr>
+        <p:spPr>
+          <a:xfrm>
+            <a:off x="7589520" y="3161211"/>
+            <a:ext cx="2168434" cy="307777"/>
+          </a:xfrm>
+          <a:prstGeom prst="rect">
+            <a:avLst/>
+          </a:prstGeom>
+          <a:solidFill>
+            <a:srgbClr val="FFFF00"/>
+          </a:solidFill>
+        </p:spPr>
+        <p:txBody>
+          <a:bodyPr wrap="square" rtlCol="0">
+            <a:spAutoFit/>
+          </a:bodyPr>
+          <a:lstStyle/>
+          <a:p>
+            <a:pPr algn="ctr"/>
+            <a:r>
+              <a:rPr lang="en-US" dirty="0"/>
+              <a:t>User Avatar</a:t>
+            </a:r>
+          </a:p>
+        </p:txBody>
+      </p:sp>
+      <p:cxnSp>
+        <p:nvCxnSpPr>
+          <p:cNvPr id="16" name="Connector: Curved 15">
+            <a:extLst>
+              <a:ext uri="{FF2B5EF4-FFF2-40B4-BE49-F238E27FC236}">
+                <a16:creationId xmlns:a16="http://schemas.microsoft.com/office/drawing/2014/main" id="{A18D8EA0-E763-DAA0-B4D3-690764B67849}"/>
+              </a:ext>
+            </a:extLst>
+          </p:cNvPr>
+          <p:cNvCxnSpPr>
+            <a:stCxn id="14" idx="2"/>
+            <a:endCxn id="13" idx="7"/>
+          </p:cNvCxnSpPr>
+          <p:nvPr/>
+        </p:nvCxnSpPr>
+        <p:spPr>
+          <a:xfrm rot="5400000" flipH="1">
+            <a:off x="7488840" y="2284091"/>
+            <a:ext cx="251530" cy="2118264"/>
+          </a:xfrm>
+          <a:prstGeom prst="curvedConnector5">
+            <a:avLst>
+              <a:gd name="adj1" fmla="val -90884"/>
+              <a:gd name="adj2" fmla="val 69993"/>
+              <a:gd name="adj3" fmla="val 190884"/>
+            </a:avLst>
+          </a:prstGeom>
+          <a:ln>
+            <a:tailEnd type="triangle"/>
+          </a:ln>
+        </p:spPr>
+        <p:style>
+          <a:lnRef idx="2">
+            <a:schemeClr val="dk1"/>
+          </a:lnRef>
+          <a:fillRef idx="0">
+            <a:schemeClr val="dk1"/>
+          </a:fillRef>
+          <a:effectRef idx="1">
+            <a:schemeClr val="dk1"/>
+          </a:effectRef>
+          <a:fontRef idx="minor">
+            <a:schemeClr val="tx1"/>
+          </a:fontRef>
+        </p:style>
+      </p:cxnSp>
+      <p:sp>
+        <p:nvSpPr>
+          <p:cNvPr id="17" name="Rectangle: Rounded Corners 16">
+            <a:extLst>
+              <a:ext uri="{FF2B5EF4-FFF2-40B4-BE49-F238E27FC236}">
+                <a16:creationId xmlns:a16="http://schemas.microsoft.com/office/drawing/2014/main" id="{0AB600B7-F87D-232B-FB45-CE72D75117D6}"/>
+              </a:ext>
+            </a:extLst>
+          </p:cNvPr>
+          <p:cNvSpPr/>
+          <p:nvPr/>
+        </p:nvSpPr>
+        <p:spPr>
+          <a:xfrm>
+            <a:off x="4193177" y="4611189"/>
+            <a:ext cx="3396343" cy="733697"/>
+          </a:xfrm>
+          <a:prstGeom prst="roundRect">
+            <a:avLst/>
+          </a:prstGeom>
+          <a:noFill/>
+        </p:spPr>
+        <p:style>
+          <a:lnRef idx="2">
+            <a:schemeClr val="accent1">
+              <a:shade val="15000"/>
+            </a:schemeClr>
+          </a:lnRef>
+          <a:fillRef idx="1">
+            <a:schemeClr val="accent1"/>
+          </a:fillRef>
+          <a:effectRef idx="0">
+            <a:schemeClr val="accent1"/>
+          </a:effectRef>
+          <a:fontRef idx="minor">
+            <a:schemeClr val="lt1"/>
+          </a:fontRef>
+        </p:style>
+        <p:txBody>
+          <a:bodyPr rtlCol="0" anchor="ctr"/>
+          <a:lstStyle/>
+          <a:p>
+            <a:pPr algn="ctr"/>
+            <a:endParaRPr lang="en-US"/>
+          </a:p>
+        </p:txBody>
+      </p:sp>
+      <p:sp>
+        <p:nvSpPr>
+          <p:cNvPr id="18" name="TextBox 17">
+            <a:extLst>
+              <a:ext uri="{FF2B5EF4-FFF2-40B4-BE49-F238E27FC236}">
+                <a16:creationId xmlns:a16="http://schemas.microsoft.com/office/drawing/2014/main" id="{A20B2EE3-12B3-5016-F7FF-947479B21664}"/>
+              </a:ext>
+            </a:extLst>
+          </p:cNvPr>
+          <p:cNvSpPr txBox="1"/>
+          <p:nvPr/>
+        </p:nvSpPr>
+        <p:spPr>
+          <a:xfrm>
+            <a:off x="9183189" y="4114800"/>
+            <a:ext cx="2467046" cy="307777"/>
+          </a:xfrm>
+          <a:prstGeom prst="rect">
+            <a:avLst/>
+          </a:prstGeom>
+          <a:solidFill>
+            <a:srgbClr val="FFFF00"/>
+          </a:solidFill>
+        </p:spPr>
+        <p:txBody>
+          <a:bodyPr wrap="square" rtlCol="0">
+            <a:spAutoFit/>
+          </a:bodyPr>
+          <a:lstStyle/>
+          <a:p>
+            <a:pPr algn="ctr"/>
+            <a:r>
+              <a:rPr lang="en-US" dirty="0" err="1"/>
+              <a:t>UserName</a:t>
+            </a:r>
+            <a:endParaRPr lang="en-US" dirty="0"/>
+          </a:p>
+        </p:txBody>
+      </p:sp>
+      <p:cxnSp>
+        <p:nvCxnSpPr>
+          <p:cNvPr id="20" name="Connector: Curved 19">
+            <a:extLst>
+              <a:ext uri="{FF2B5EF4-FFF2-40B4-BE49-F238E27FC236}">
+                <a16:creationId xmlns:a16="http://schemas.microsoft.com/office/drawing/2014/main" id="{F0686970-C438-DA99-CA50-7B6A29C17C16}"/>
+              </a:ext>
+            </a:extLst>
+          </p:cNvPr>
+          <p:cNvCxnSpPr>
+            <a:stCxn id="18" idx="2"/>
+            <a:endCxn id="17" idx="3"/>
+          </p:cNvCxnSpPr>
+          <p:nvPr/>
+        </p:nvCxnSpPr>
+        <p:spPr>
+          <a:xfrm rot="5400000">
+            <a:off x="8725386" y="3286711"/>
+            <a:ext cx="555461" cy="2827192"/>
+          </a:xfrm>
+          <a:prstGeom prst="curvedConnector2">
+            <a:avLst/>
+          </a:prstGeom>
+          <a:ln>
+            <a:tailEnd type="triangle"/>
+          </a:ln>
+        </p:spPr>
+        <p:style>
+          <a:lnRef idx="2">
+            <a:schemeClr val="accent1"/>
+          </a:lnRef>
+          <a:fillRef idx="0">
+            <a:schemeClr val="accent1"/>
+          </a:fillRef>
+          <a:effectRef idx="1">
+            <a:schemeClr val="accent1"/>
+          </a:effectRef>
+          <a:fontRef idx="minor">
+            <a:schemeClr val="tx1"/>
+          </a:fontRef>
+        </p:style>
+      </p:cxnSp>
     </p:spTree>
     <p:extLst>
       <p:ext uri="{BB962C8B-B14F-4D97-AF65-F5344CB8AC3E}">
@@ -12134,6 +12560,397 @@
           </a:fontRef>
         </p:style>
       </p:cxnSp>
+      <p:sp>
+        <p:nvSpPr>
+          <p:cNvPr id="2" name="Rectangle: Rounded Corners 1">
+            <a:extLst>
+              <a:ext uri="{FF2B5EF4-FFF2-40B4-BE49-F238E27FC236}">
+                <a16:creationId xmlns:a16="http://schemas.microsoft.com/office/drawing/2014/main" id="{2F616863-2FEE-5B69-0383-50937CDDA8FE}"/>
+              </a:ext>
+            </a:extLst>
+          </p:cNvPr>
+          <p:cNvSpPr/>
+          <p:nvPr/>
+        </p:nvSpPr>
+        <p:spPr>
+          <a:xfrm>
+            <a:off x="2962275" y="2171700"/>
+            <a:ext cx="1476375" cy="609600"/>
+          </a:xfrm>
+          <a:prstGeom prst="roundRect">
+            <a:avLst/>
+          </a:prstGeom>
+          <a:noFill/>
+        </p:spPr>
+        <p:style>
+          <a:lnRef idx="2">
+            <a:schemeClr val="accent1">
+              <a:shade val="15000"/>
+            </a:schemeClr>
+          </a:lnRef>
+          <a:fillRef idx="1">
+            <a:schemeClr val="accent1"/>
+          </a:fillRef>
+          <a:effectRef idx="0">
+            <a:schemeClr val="accent1"/>
+          </a:effectRef>
+          <a:fontRef idx="minor">
+            <a:schemeClr val="lt1"/>
+          </a:fontRef>
+        </p:style>
+        <p:txBody>
+          <a:bodyPr rtlCol="0" anchor="ctr"/>
+          <a:lstStyle/>
+          <a:p>
+            <a:pPr algn="ctr"/>
+            <a:endParaRPr lang="en-US"/>
+          </a:p>
+        </p:txBody>
+      </p:sp>
+      <p:sp>
+        <p:nvSpPr>
+          <p:cNvPr id="3" name="TextBox 2">
+            <a:extLst>
+              <a:ext uri="{FF2B5EF4-FFF2-40B4-BE49-F238E27FC236}">
+                <a16:creationId xmlns:a16="http://schemas.microsoft.com/office/drawing/2014/main" id="{9FA41A8A-D11A-49F5-3546-A087DDB304F3}"/>
+              </a:ext>
+            </a:extLst>
+          </p:cNvPr>
+          <p:cNvSpPr txBox="1"/>
+          <p:nvPr/>
+        </p:nvSpPr>
+        <p:spPr>
+          <a:xfrm>
+            <a:off x="1566230" y="219075"/>
+            <a:ext cx="1966403" cy="307777"/>
+          </a:xfrm>
+          <a:prstGeom prst="rect">
+            <a:avLst/>
+          </a:prstGeom>
+          <a:solidFill>
+            <a:srgbClr val="FFFF00"/>
+          </a:solidFill>
+        </p:spPr>
+        <p:txBody>
+          <a:bodyPr wrap="square" rtlCol="0">
+            <a:spAutoFit/>
+          </a:bodyPr>
+          <a:lstStyle/>
+          <a:p>
+            <a:pPr algn="ctr"/>
+            <a:r>
+              <a:rPr lang="en-US" dirty="0"/>
+              <a:t>Product Item name</a:t>
+            </a:r>
+          </a:p>
+        </p:txBody>
+      </p:sp>
+      <p:cxnSp>
+        <p:nvCxnSpPr>
+          <p:cNvPr id="8" name="Connector: Curved 7">
+            <a:extLst>
+              <a:ext uri="{FF2B5EF4-FFF2-40B4-BE49-F238E27FC236}">
+                <a16:creationId xmlns:a16="http://schemas.microsoft.com/office/drawing/2014/main" id="{A6B832A4-1CB6-31E0-FE58-05E105E9D292}"/>
+              </a:ext>
+            </a:extLst>
+          </p:cNvPr>
+          <p:cNvCxnSpPr>
+            <a:endCxn id="2" idx="0"/>
+          </p:cNvCxnSpPr>
+          <p:nvPr/>
+        </p:nvCxnSpPr>
+        <p:spPr>
+          <a:xfrm rot="16200000" flipH="1">
+            <a:off x="2294632" y="765869"/>
+            <a:ext cx="1644848" cy="1166813"/>
+          </a:xfrm>
+          <a:prstGeom prst="curvedConnector3">
+            <a:avLst/>
+          </a:prstGeom>
+          <a:ln>
+            <a:tailEnd type="triangle"/>
+          </a:ln>
+        </p:spPr>
+        <p:style>
+          <a:lnRef idx="2">
+            <a:schemeClr val="dk1"/>
+          </a:lnRef>
+          <a:fillRef idx="0">
+            <a:schemeClr val="dk1"/>
+          </a:fillRef>
+          <a:effectRef idx="1">
+            <a:schemeClr val="dk1"/>
+          </a:effectRef>
+          <a:fontRef idx="minor">
+            <a:schemeClr val="tx1"/>
+          </a:fontRef>
+        </p:style>
+      </p:cxnSp>
+      <p:sp>
+        <p:nvSpPr>
+          <p:cNvPr id="10" name="Rectangle: Rounded Corners 9">
+            <a:extLst>
+              <a:ext uri="{FF2B5EF4-FFF2-40B4-BE49-F238E27FC236}">
+                <a16:creationId xmlns:a16="http://schemas.microsoft.com/office/drawing/2014/main" id="{B02A6FE5-C0F7-3AE8-A35A-E1214799D6AD}"/>
+              </a:ext>
+            </a:extLst>
+          </p:cNvPr>
+          <p:cNvSpPr/>
+          <p:nvPr/>
+        </p:nvSpPr>
+        <p:spPr>
+          <a:xfrm>
+            <a:off x="2816352" y="2781300"/>
+            <a:ext cx="1869948" cy="1077549"/>
+          </a:xfrm>
+          <a:prstGeom prst="roundRect">
+            <a:avLst/>
+          </a:prstGeom>
+          <a:noFill/>
+          <a:ln>
+            <a:solidFill>
+              <a:srgbClr val="FFFF00"/>
+            </a:solidFill>
+          </a:ln>
+        </p:spPr>
+        <p:style>
+          <a:lnRef idx="2">
+            <a:schemeClr val="accent1">
+              <a:shade val="15000"/>
+            </a:schemeClr>
+          </a:lnRef>
+          <a:fillRef idx="1">
+            <a:schemeClr val="accent1"/>
+          </a:fillRef>
+          <a:effectRef idx="0">
+            <a:schemeClr val="accent1"/>
+          </a:effectRef>
+          <a:fontRef idx="minor">
+            <a:schemeClr val="lt1"/>
+          </a:fontRef>
+        </p:style>
+        <p:txBody>
+          <a:bodyPr rtlCol="0" anchor="ctr"/>
+          <a:lstStyle/>
+          <a:p>
+            <a:pPr algn="ctr"/>
+            <a:endParaRPr lang="en-US"/>
+          </a:p>
+        </p:txBody>
+      </p:sp>
+      <p:sp>
+        <p:nvSpPr>
+          <p:cNvPr id="12" name="TextBox 11">
+            <a:extLst>
+              <a:ext uri="{FF2B5EF4-FFF2-40B4-BE49-F238E27FC236}">
+                <a16:creationId xmlns:a16="http://schemas.microsoft.com/office/drawing/2014/main" id="{8F3828A1-FBB8-B7F8-98D9-124527F68941}"/>
+              </a:ext>
+            </a:extLst>
+          </p:cNvPr>
+          <p:cNvSpPr txBox="1"/>
+          <p:nvPr/>
+        </p:nvSpPr>
+        <p:spPr>
+          <a:xfrm>
+            <a:off x="269146" y="3275110"/>
+            <a:ext cx="1201675" cy="307777"/>
+          </a:xfrm>
+          <a:prstGeom prst="rect">
+            <a:avLst/>
+          </a:prstGeom>
+          <a:solidFill>
+            <a:srgbClr val="FFFF00"/>
+          </a:solidFill>
+        </p:spPr>
+        <p:txBody>
+          <a:bodyPr wrap="square" rtlCol="0">
+            <a:spAutoFit/>
+          </a:bodyPr>
+          <a:lstStyle/>
+          <a:p>
+            <a:pPr algn="ctr"/>
+            <a:r>
+              <a:rPr lang="en-US" dirty="0"/>
+              <a:t>Promotion</a:t>
+            </a:r>
+          </a:p>
+        </p:txBody>
+      </p:sp>
+      <p:cxnSp>
+        <p:nvCxnSpPr>
+          <p:cNvPr id="14" name="Connector: Curved 13">
+            <a:extLst>
+              <a:ext uri="{FF2B5EF4-FFF2-40B4-BE49-F238E27FC236}">
+                <a16:creationId xmlns:a16="http://schemas.microsoft.com/office/drawing/2014/main" id="{83637DC7-5C73-ACDE-F90F-CDA37B4FC50F}"/>
+              </a:ext>
+            </a:extLst>
+          </p:cNvPr>
+          <p:cNvCxnSpPr>
+            <a:cxnSpLocks/>
+            <a:stCxn id="12" idx="3"/>
+            <a:endCxn id="10" idx="1"/>
+          </p:cNvCxnSpPr>
+          <p:nvPr/>
+        </p:nvCxnSpPr>
+        <p:spPr>
+          <a:xfrm flipV="1">
+            <a:off x="1470821" y="3320075"/>
+            <a:ext cx="1345531" cy="108924"/>
+          </a:xfrm>
+          <a:prstGeom prst="curvedConnector3">
+            <a:avLst/>
+          </a:prstGeom>
+          <a:ln>
+            <a:tailEnd type="triangle"/>
+          </a:ln>
+        </p:spPr>
+        <p:style>
+          <a:lnRef idx="1">
+            <a:schemeClr val="accent1"/>
+          </a:lnRef>
+          <a:fillRef idx="0">
+            <a:schemeClr val="accent1"/>
+          </a:fillRef>
+          <a:effectRef idx="0">
+            <a:schemeClr val="accent1"/>
+          </a:effectRef>
+          <a:fontRef idx="minor">
+            <a:schemeClr val="tx1"/>
+          </a:fontRef>
+        </p:style>
+      </p:cxnSp>
+      <p:sp>
+        <p:nvSpPr>
+          <p:cNvPr id="21" name="Rectangle: Rounded Corners 20">
+            <a:extLst>
+              <a:ext uri="{FF2B5EF4-FFF2-40B4-BE49-F238E27FC236}">
+                <a16:creationId xmlns:a16="http://schemas.microsoft.com/office/drawing/2014/main" id="{71789F54-E19F-E8E2-637B-36D6811CBB15}"/>
+              </a:ext>
+            </a:extLst>
+          </p:cNvPr>
+          <p:cNvSpPr/>
+          <p:nvPr/>
+        </p:nvSpPr>
+        <p:spPr>
+          <a:xfrm>
+            <a:off x="2886075" y="3858849"/>
+            <a:ext cx="1676400" cy="413725"/>
+          </a:xfrm>
+          <a:prstGeom prst="roundRect">
+            <a:avLst/>
+          </a:prstGeom>
+          <a:noFill/>
+          <a:ln>
+            <a:solidFill>
+              <a:srgbClr val="FF0000"/>
+            </a:solidFill>
+          </a:ln>
+        </p:spPr>
+        <p:style>
+          <a:lnRef idx="2">
+            <a:schemeClr val="accent1">
+              <a:shade val="15000"/>
+            </a:schemeClr>
+          </a:lnRef>
+          <a:fillRef idx="1">
+            <a:schemeClr val="accent1"/>
+          </a:fillRef>
+          <a:effectRef idx="0">
+            <a:schemeClr val="accent1"/>
+          </a:effectRef>
+          <a:fontRef idx="minor">
+            <a:schemeClr val="lt1"/>
+          </a:fontRef>
+        </p:style>
+        <p:txBody>
+          <a:bodyPr rtlCol="0" anchor="ctr"/>
+          <a:lstStyle/>
+          <a:p>
+            <a:pPr algn="ctr"/>
+            <a:endParaRPr lang="en-US"/>
+          </a:p>
+        </p:txBody>
+      </p:sp>
+      <p:sp>
+        <p:nvSpPr>
+          <p:cNvPr id="22" name="TextBox 21">
+            <a:extLst>
+              <a:ext uri="{FF2B5EF4-FFF2-40B4-BE49-F238E27FC236}">
+                <a16:creationId xmlns:a16="http://schemas.microsoft.com/office/drawing/2014/main" id="{24744F96-C164-C167-7BF5-7C4D8663C46A}"/>
+              </a:ext>
+            </a:extLst>
+          </p:cNvPr>
+          <p:cNvSpPr txBox="1"/>
+          <p:nvPr/>
+        </p:nvSpPr>
+        <p:spPr>
+          <a:xfrm>
+            <a:off x="409575" y="3858849"/>
+            <a:ext cx="666750" cy="307777"/>
+          </a:xfrm>
+          <a:prstGeom prst="rect">
+            <a:avLst/>
+          </a:prstGeom>
+          <a:solidFill>
+            <a:srgbClr val="FFFF00"/>
+          </a:solidFill>
+        </p:spPr>
+        <p:txBody>
+          <a:bodyPr wrap="square" rtlCol="0">
+            <a:spAutoFit/>
+          </a:bodyPr>
+          <a:lstStyle/>
+          <a:p>
+            <a:pPr algn="ctr"/>
+            <a:r>
+              <a:rPr lang="en-US" dirty="0"/>
+              <a:t>Cost</a:t>
+            </a:r>
+          </a:p>
+        </p:txBody>
+      </p:sp>
+      <p:cxnSp>
+        <p:nvCxnSpPr>
+          <p:cNvPr id="24" name="Connector: Curved 23">
+            <a:extLst>
+              <a:ext uri="{FF2B5EF4-FFF2-40B4-BE49-F238E27FC236}">
+                <a16:creationId xmlns:a16="http://schemas.microsoft.com/office/drawing/2014/main" id="{E23974AC-51AB-D95D-FF56-96D50AD8B038}"/>
+              </a:ext>
+            </a:extLst>
+          </p:cNvPr>
+          <p:cNvCxnSpPr>
+            <a:stCxn id="22" idx="3"/>
+            <a:endCxn id="21" idx="1"/>
+          </p:cNvCxnSpPr>
+          <p:nvPr/>
+        </p:nvCxnSpPr>
+        <p:spPr>
+          <a:xfrm>
+            <a:off x="1076325" y="4012738"/>
+            <a:ext cx="1809750" cy="52974"/>
+          </a:xfrm>
+          <a:prstGeom prst="curvedConnector3">
+            <a:avLst/>
+          </a:prstGeom>
+          <a:ln>
+            <a:tailEnd type="triangle"/>
+          </a:ln>
+        </p:spPr>
+        <p:style>
+          <a:lnRef idx="1">
+            <a:schemeClr val="accent1"/>
+          </a:lnRef>
+          <a:fillRef idx="0">
+            <a:schemeClr val="accent1"/>
+          </a:fillRef>
+          <a:effectRef idx="0">
+            <a:schemeClr val="accent1"/>
+          </a:effectRef>
+          <a:fontRef idx="minor">
+            <a:schemeClr val="tx1"/>
+          </a:fontRef>
+        </p:style>
+      </p:cxnSp>
     </p:spTree>
     <p:extLst>
       <p:ext uri="{BB962C8B-B14F-4D97-AF65-F5344CB8AC3E}">
@@ -12314,6 +13131,264 @@
           </a:fillRef>
           <a:effectRef idx="1">
             <a:schemeClr val="accent4"/>
+          </a:effectRef>
+          <a:fontRef idx="minor">
+            <a:schemeClr val="tx1"/>
+          </a:fontRef>
+        </p:style>
+      </p:cxnSp>
+      <p:sp>
+        <p:nvSpPr>
+          <p:cNvPr id="2" name="Rectangle: Rounded Corners 1">
+            <a:extLst>
+              <a:ext uri="{FF2B5EF4-FFF2-40B4-BE49-F238E27FC236}">
+                <a16:creationId xmlns:a16="http://schemas.microsoft.com/office/drawing/2014/main" id="{C2B236B4-6BA7-3B53-E3D6-2C243EA530ED}"/>
+              </a:ext>
+            </a:extLst>
+          </p:cNvPr>
+          <p:cNvSpPr/>
+          <p:nvPr/>
+        </p:nvSpPr>
+        <p:spPr>
+          <a:xfrm>
+            <a:off x="3357154" y="1724297"/>
+            <a:ext cx="1293223" cy="391886"/>
+          </a:xfrm>
+          <a:prstGeom prst="roundRect">
+            <a:avLst/>
+          </a:prstGeom>
+          <a:noFill/>
+        </p:spPr>
+        <p:style>
+          <a:lnRef idx="2">
+            <a:schemeClr val="accent1">
+              <a:shade val="15000"/>
+            </a:schemeClr>
+          </a:lnRef>
+          <a:fillRef idx="1">
+            <a:schemeClr val="accent1"/>
+          </a:fillRef>
+          <a:effectRef idx="0">
+            <a:schemeClr val="accent1"/>
+          </a:effectRef>
+          <a:fontRef idx="minor">
+            <a:schemeClr val="lt1"/>
+          </a:fontRef>
+        </p:style>
+        <p:txBody>
+          <a:bodyPr rtlCol="0" anchor="ctr"/>
+          <a:lstStyle/>
+          <a:p>
+            <a:pPr algn="ctr"/>
+            <a:endParaRPr lang="en-US"/>
+          </a:p>
+        </p:txBody>
+      </p:sp>
+      <p:sp>
+        <p:nvSpPr>
+          <p:cNvPr id="3" name="TextBox 2">
+            <a:extLst>
+              <a:ext uri="{FF2B5EF4-FFF2-40B4-BE49-F238E27FC236}">
+                <a16:creationId xmlns:a16="http://schemas.microsoft.com/office/drawing/2014/main" id="{91B6DE70-13E8-9E24-DBC8-76C0D5316F7B}"/>
+              </a:ext>
+            </a:extLst>
+          </p:cNvPr>
+          <p:cNvSpPr txBox="1"/>
+          <p:nvPr/>
+        </p:nvSpPr>
+        <p:spPr>
+          <a:xfrm>
+            <a:off x="1292569" y="2024743"/>
+            <a:ext cx="1410789" cy="307777"/>
+          </a:xfrm>
+          <a:prstGeom prst="rect">
+            <a:avLst/>
+          </a:prstGeom>
+          <a:solidFill>
+            <a:srgbClr val="FFFF00"/>
+          </a:solidFill>
+        </p:spPr>
+        <p:txBody>
+          <a:bodyPr wrap="square" rtlCol="0">
+            <a:spAutoFit/>
+          </a:bodyPr>
+          <a:lstStyle/>
+          <a:p>
+            <a:pPr algn="ctr"/>
+            <a:r>
+              <a:rPr lang="en-US" dirty="0"/>
+              <a:t>Setting key</a:t>
+            </a:r>
+          </a:p>
+        </p:txBody>
+      </p:sp>
+      <p:cxnSp>
+        <p:nvCxnSpPr>
+          <p:cNvPr id="8" name="Connector: Curved 7">
+            <a:extLst>
+              <a:ext uri="{FF2B5EF4-FFF2-40B4-BE49-F238E27FC236}">
+                <a16:creationId xmlns:a16="http://schemas.microsoft.com/office/drawing/2014/main" id="{0E9B72B2-5670-2372-7D31-99B79BF42CF2}"/>
+              </a:ext>
+            </a:extLst>
+          </p:cNvPr>
+          <p:cNvCxnSpPr>
+            <a:stCxn id="3" idx="3"/>
+            <a:endCxn id="2" idx="1"/>
+          </p:cNvCxnSpPr>
+          <p:nvPr/>
+        </p:nvCxnSpPr>
+        <p:spPr>
+          <a:xfrm flipV="1">
+            <a:off x="2703358" y="1920240"/>
+            <a:ext cx="653796" cy="258392"/>
+          </a:xfrm>
+          <a:prstGeom prst="curvedConnector3">
+            <a:avLst/>
+          </a:prstGeom>
+          <a:ln>
+            <a:tailEnd type="triangle"/>
+          </a:ln>
+        </p:spPr>
+        <p:style>
+          <a:lnRef idx="2">
+            <a:schemeClr val="dk1"/>
+          </a:lnRef>
+          <a:fillRef idx="0">
+            <a:schemeClr val="dk1"/>
+          </a:fillRef>
+          <a:effectRef idx="1">
+            <a:schemeClr val="dk1"/>
+          </a:effectRef>
+          <a:fontRef idx="minor">
+            <a:schemeClr val="tx1"/>
+          </a:fontRef>
+        </p:style>
+      </p:cxnSp>
+      <p:sp>
+        <p:nvSpPr>
+          <p:cNvPr id="11" name="Rectangle: Rounded Corners 10">
+            <a:extLst>
+              <a:ext uri="{FF2B5EF4-FFF2-40B4-BE49-F238E27FC236}">
+                <a16:creationId xmlns:a16="http://schemas.microsoft.com/office/drawing/2014/main" id="{65605AA4-C252-55AC-689B-952F4A6436F0}"/>
+              </a:ext>
+            </a:extLst>
+          </p:cNvPr>
+          <p:cNvSpPr/>
+          <p:nvPr/>
+        </p:nvSpPr>
+        <p:spPr>
+          <a:xfrm>
+            <a:off x="3357154" y="2116183"/>
+            <a:ext cx="1293223" cy="653143"/>
+          </a:xfrm>
+          <a:prstGeom prst="roundRect">
+            <a:avLst/>
+          </a:prstGeom>
+          <a:noFill/>
+          <a:ln>
+            <a:solidFill>
+              <a:srgbClr val="FF0000"/>
+            </a:solidFill>
+          </a:ln>
+        </p:spPr>
+        <p:style>
+          <a:lnRef idx="2">
+            <a:schemeClr val="accent1">
+              <a:shade val="15000"/>
+            </a:schemeClr>
+          </a:lnRef>
+          <a:fillRef idx="1">
+            <a:schemeClr val="accent1"/>
+          </a:fillRef>
+          <a:effectRef idx="0">
+            <a:schemeClr val="accent1"/>
+          </a:effectRef>
+          <a:fontRef idx="minor">
+            <a:schemeClr val="lt1"/>
+          </a:fontRef>
+        </p:style>
+        <p:txBody>
+          <a:bodyPr rtlCol="0" anchor="ctr"/>
+          <a:lstStyle/>
+          <a:p>
+            <a:pPr algn="ctr"/>
+            <a:endParaRPr lang="en-US"/>
+          </a:p>
+        </p:txBody>
+      </p:sp>
+      <p:sp>
+        <p:nvSpPr>
+          <p:cNvPr id="12" name="TextBox 11">
+            <a:extLst>
+              <a:ext uri="{FF2B5EF4-FFF2-40B4-BE49-F238E27FC236}">
+                <a16:creationId xmlns:a16="http://schemas.microsoft.com/office/drawing/2014/main" id="{E36C4F01-9552-B249-3587-7205A942735C}"/>
+              </a:ext>
+            </a:extLst>
+          </p:cNvPr>
+          <p:cNvSpPr txBox="1"/>
+          <p:nvPr/>
+        </p:nvSpPr>
+        <p:spPr>
+          <a:xfrm>
+            <a:off x="1292569" y="2769326"/>
+            <a:ext cx="1724951" cy="307777"/>
+          </a:xfrm>
+          <a:prstGeom prst="rect">
+            <a:avLst/>
+          </a:prstGeom>
+          <a:solidFill>
+            <a:srgbClr val="FFFF00"/>
+          </a:solidFill>
+        </p:spPr>
+        <p:txBody>
+          <a:bodyPr wrap="square" rtlCol="0">
+            <a:spAutoFit/>
+          </a:bodyPr>
+          <a:lstStyle/>
+          <a:p>
+            <a:pPr algn="ctr"/>
+            <a:r>
+              <a:rPr lang="en-US" dirty="0"/>
+              <a:t>Setting Value</a:t>
+            </a:r>
+          </a:p>
+        </p:txBody>
+      </p:sp>
+      <p:cxnSp>
+        <p:nvCxnSpPr>
+          <p:cNvPr id="14" name="Connector: Curved 13">
+            <a:extLst>
+              <a:ext uri="{FF2B5EF4-FFF2-40B4-BE49-F238E27FC236}">
+                <a16:creationId xmlns:a16="http://schemas.microsoft.com/office/drawing/2014/main" id="{DDCAB130-E155-C2F6-66A6-082032993DCE}"/>
+              </a:ext>
+            </a:extLst>
+          </p:cNvPr>
+          <p:cNvCxnSpPr>
+            <a:endCxn id="11" idx="1"/>
+          </p:cNvCxnSpPr>
+          <p:nvPr/>
+        </p:nvCxnSpPr>
+        <p:spPr>
+          <a:xfrm rot="5400000" flipH="1" flipV="1">
+            <a:off x="2939143" y="2521132"/>
+            <a:ext cx="496388" cy="339634"/>
+          </a:xfrm>
+          <a:prstGeom prst="curvedConnector2">
+            <a:avLst/>
+          </a:prstGeom>
+          <a:ln>
+            <a:tailEnd type="triangle"/>
+          </a:ln>
+        </p:spPr>
+        <p:style>
+          <a:lnRef idx="2">
+            <a:schemeClr val="dk1"/>
+          </a:lnRef>
+          <a:fillRef idx="0">
+            <a:schemeClr val="dk1"/>
+          </a:fillRef>
+          <a:effectRef idx="1">
+            <a:schemeClr val="dk1"/>
           </a:effectRef>
           <a:fontRef idx="minor">
             <a:schemeClr val="tx1"/>
@@ -12935,6 +14010,902 @@
           </a:fontRef>
         </p:style>
       </p:cxnSp>
+      <p:sp>
+        <p:nvSpPr>
+          <p:cNvPr id="2" name="Rectangle: Rounded Corners 1">
+            <a:extLst>
+              <a:ext uri="{FF2B5EF4-FFF2-40B4-BE49-F238E27FC236}">
+                <a16:creationId xmlns:a16="http://schemas.microsoft.com/office/drawing/2014/main" id="{1264CD24-4850-5383-7096-58509935D9C4}"/>
+              </a:ext>
+            </a:extLst>
+          </p:cNvPr>
+          <p:cNvSpPr/>
+          <p:nvPr/>
+        </p:nvSpPr>
+        <p:spPr>
+          <a:xfrm>
+            <a:off x="2119313" y="2157413"/>
+            <a:ext cx="280987" cy="258795"/>
+          </a:xfrm>
+          <a:prstGeom prst="roundRect">
+            <a:avLst/>
+          </a:prstGeom>
+          <a:noFill/>
+        </p:spPr>
+        <p:style>
+          <a:lnRef idx="2">
+            <a:schemeClr val="accent1">
+              <a:shade val="15000"/>
+            </a:schemeClr>
+          </a:lnRef>
+          <a:fillRef idx="1">
+            <a:schemeClr val="accent1"/>
+          </a:fillRef>
+          <a:effectRef idx="0">
+            <a:schemeClr val="accent1"/>
+          </a:effectRef>
+          <a:fontRef idx="minor">
+            <a:schemeClr val="lt1"/>
+          </a:fontRef>
+        </p:style>
+        <p:txBody>
+          <a:bodyPr rtlCol="0" anchor="ctr"/>
+          <a:lstStyle/>
+          <a:p>
+            <a:pPr algn="ctr"/>
+            <a:endParaRPr lang="en-US"/>
+          </a:p>
+        </p:txBody>
+      </p:sp>
+      <p:sp>
+        <p:nvSpPr>
+          <p:cNvPr id="3" name="TextBox 2">
+            <a:extLst>
+              <a:ext uri="{FF2B5EF4-FFF2-40B4-BE49-F238E27FC236}">
+                <a16:creationId xmlns:a16="http://schemas.microsoft.com/office/drawing/2014/main" id="{0C975C9A-A16F-D406-4233-8E8BD6144AA2}"/>
+              </a:ext>
+            </a:extLst>
+          </p:cNvPr>
+          <p:cNvSpPr txBox="1"/>
+          <p:nvPr/>
+        </p:nvSpPr>
+        <p:spPr>
+          <a:xfrm>
+            <a:off x="1071563" y="1433513"/>
+            <a:ext cx="668865" cy="307777"/>
+          </a:xfrm>
+          <a:prstGeom prst="rect">
+            <a:avLst/>
+          </a:prstGeom>
+          <a:solidFill>
+            <a:srgbClr val="FFFF00"/>
+          </a:solidFill>
+        </p:spPr>
+        <p:txBody>
+          <a:bodyPr wrap="square" rtlCol="0">
+            <a:spAutoFit/>
+          </a:bodyPr>
+          <a:lstStyle/>
+          <a:p>
+            <a:pPr algn="ctr"/>
+            <a:r>
+              <a:rPr lang="en-US" dirty="0"/>
+              <a:t>Icon</a:t>
+            </a:r>
+          </a:p>
+        </p:txBody>
+      </p:sp>
+      <p:cxnSp>
+        <p:nvCxnSpPr>
+          <p:cNvPr id="5" name="Connector: Curved 4">
+            <a:extLst>
+              <a:ext uri="{FF2B5EF4-FFF2-40B4-BE49-F238E27FC236}">
+                <a16:creationId xmlns:a16="http://schemas.microsoft.com/office/drawing/2014/main" id="{580C4AF3-FFE8-644D-4D61-5AC81E0EB642}"/>
+              </a:ext>
+            </a:extLst>
+          </p:cNvPr>
+          <p:cNvCxnSpPr>
+            <a:endCxn id="2" idx="0"/>
+          </p:cNvCxnSpPr>
+          <p:nvPr/>
+        </p:nvCxnSpPr>
+        <p:spPr>
+          <a:xfrm>
+            <a:off x="1400175" y="1741290"/>
+            <a:ext cx="859632" cy="416123"/>
+          </a:xfrm>
+          <a:prstGeom prst="curvedConnector2">
+            <a:avLst/>
+          </a:prstGeom>
+          <a:ln>
+            <a:tailEnd type="triangle"/>
+          </a:ln>
+        </p:spPr>
+        <p:style>
+          <a:lnRef idx="2">
+            <a:schemeClr val="accent1"/>
+          </a:lnRef>
+          <a:fillRef idx="0">
+            <a:schemeClr val="accent1"/>
+          </a:fillRef>
+          <a:effectRef idx="1">
+            <a:schemeClr val="accent1"/>
+          </a:effectRef>
+          <a:fontRef idx="minor">
+            <a:schemeClr val="tx1"/>
+          </a:fontRef>
+        </p:style>
+      </p:cxnSp>
+      <p:sp>
+        <p:nvSpPr>
+          <p:cNvPr id="9" name="Rectangle: Rounded Corners 8">
+            <a:extLst>
+              <a:ext uri="{FF2B5EF4-FFF2-40B4-BE49-F238E27FC236}">
+                <a16:creationId xmlns:a16="http://schemas.microsoft.com/office/drawing/2014/main" id="{EC448106-96DE-4AE0-FD3E-727DB4EEEC5B}"/>
+              </a:ext>
+            </a:extLst>
+          </p:cNvPr>
+          <p:cNvSpPr/>
+          <p:nvPr/>
+        </p:nvSpPr>
+        <p:spPr>
+          <a:xfrm>
+            <a:off x="2438400" y="2157413"/>
+            <a:ext cx="485775" cy="142875"/>
+          </a:xfrm>
+          <a:prstGeom prst="roundRect">
+            <a:avLst/>
+          </a:prstGeom>
+          <a:noFill/>
+          <a:ln>
+            <a:solidFill>
+              <a:srgbClr val="FF0000"/>
+            </a:solidFill>
+          </a:ln>
+        </p:spPr>
+        <p:style>
+          <a:lnRef idx="2">
+            <a:schemeClr val="accent1">
+              <a:shade val="15000"/>
+            </a:schemeClr>
+          </a:lnRef>
+          <a:fillRef idx="1">
+            <a:schemeClr val="accent1"/>
+          </a:fillRef>
+          <a:effectRef idx="0">
+            <a:schemeClr val="accent1"/>
+          </a:effectRef>
+          <a:fontRef idx="minor">
+            <a:schemeClr val="lt1"/>
+          </a:fontRef>
+        </p:style>
+        <p:txBody>
+          <a:bodyPr rtlCol="0" anchor="ctr"/>
+          <a:lstStyle/>
+          <a:p>
+            <a:pPr algn="ctr"/>
+            <a:endParaRPr lang="en-US"/>
+          </a:p>
+        </p:txBody>
+      </p:sp>
+      <p:sp>
+        <p:nvSpPr>
+          <p:cNvPr id="14" name="TextBox 13">
+            <a:extLst>
+              <a:ext uri="{FF2B5EF4-FFF2-40B4-BE49-F238E27FC236}">
+                <a16:creationId xmlns:a16="http://schemas.microsoft.com/office/drawing/2014/main" id="{DD1371CB-0817-E42B-D3D1-0C8E1500108F}"/>
+              </a:ext>
+            </a:extLst>
+          </p:cNvPr>
+          <p:cNvSpPr txBox="1"/>
+          <p:nvPr/>
+        </p:nvSpPr>
+        <p:spPr>
+          <a:xfrm>
+            <a:off x="985838" y="2224088"/>
+            <a:ext cx="754590" cy="307777"/>
+          </a:xfrm>
+          <a:prstGeom prst="rect">
+            <a:avLst/>
+          </a:prstGeom>
+          <a:solidFill>
+            <a:srgbClr val="FFFF00"/>
+          </a:solidFill>
+        </p:spPr>
+        <p:txBody>
+          <a:bodyPr wrap="square" rtlCol="0">
+            <a:spAutoFit/>
+          </a:bodyPr>
+          <a:lstStyle/>
+          <a:p>
+            <a:pPr algn="ctr"/>
+            <a:r>
+              <a:rPr lang="en-US" dirty="0"/>
+              <a:t>Name</a:t>
+            </a:r>
+          </a:p>
+        </p:txBody>
+      </p:sp>
+      <p:cxnSp>
+        <p:nvCxnSpPr>
+          <p:cNvPr id="18" name="Connector: Curved 17">
+            <a:extLst>
+              <a:ext uri="{FF2B5EF4-FFF2-40B4-BE49-F238E27FC236}">
+                <a16:creationId xmlns:a16="http://schemas.microsoft.com/office/drawing/2014/main" id="{9275D93B-3C75-0662-A157-7A2D05A94917}"/>
+              </a:ext>
+            </a:extLst>
+          </p:cNvPr>
+          <p:cNvCxnSpPr>
+            <a:endCxn id="9" idx="0"/>
+          </p:cNvCxnSpPr>
+          <p:nvPr/>
+        </p:nvCxnSpPr>
+        <p:spPr>
+          <a:xfrm flipV="1">
+            <a:off x="1740428" y="2157413"/>
+            <a:ext cx="940860" cy="258795"/>
+          </a:xfrm>
+          <a:prstGeom prst="curvedConnector4">
+            <a:avLst>
+              <a:gd name="adj1" fmla="val 37092"/>
+              <a:gd name="adj2" fmla="val 188332"/>
+            </a:avLst>
+          </a:prstGeom>
+          <a:ln>
+            <a:tailEnd type="triangle"/>
+          </a:ln>
+        </p:spPr>
+        <p:style>
+          <a:lnRef idx="2">
+            <a:schemeClr val="accent1"/>
+          </a:lnRef>
+          <a:fillRef idx="0">
+            <a:schemeClr val="accent1"/>
+          </a:fillRef>
+          <a:effectRef idx="1">
+            <a:schemeClr val="accent1"/>
+          </a:effectRef>
+          <a:fontRef idx="minor">
+            <a:schemeClr val="tx1"/>
+          </a:fontRef>
+        </p:style>
+      </p:cxnSp>
+      <p:sp>
+        <p:nvSpPr>
+          <p:cNvPr id="20" name="Rectangle: Rounded Corners 19">
+            <a:extLst>
+              <a:ext uri="{FF2B5EF4-FFF2-40B4-BE49-F238E27FC236}">
+                <a16:creationId xmlns:a16="http://schemas.microsoft.com/office/drawing/2014/main" id="{86B83742-FA2A-8594-DF70-5B18E1D0F25E}"/>
+              </a:ext>
+            </a:extLst>
+          </p:cNvPr>
+          <p:cNvSpPr/>
+          <p:nvPr/>
+        </p:nvSpPr>
+        <p:spPr>
+          <a:xfrm>
+            <a:off x="2119313" y="3314700"/>
+            <a:ext cx="300037" cy="242888"/>
+          </a:xfrm>
+          <a:prstGeom prst="roundRect">
+            <a:avLst/>
+          </a:prstGeom>
+          <a:noFill/>
+        </p:spPr>
+        <p:style>
+          <a:lnRef idx="2">
+            <a:schemeClr val="accent1">
+              <a:shade val="15000"/>
+            </a:schemeClr>
+          </a:lnRef>
+          <a:fillRef idx="1">
+            <a:schemeClr val="accent1"/>
+          </a:fillRef>
+          <a:effectRef idx="0">
+            <a:schemeClr val="accent1"/>
+          </a:effectRef>
+          <a:fontRef idx="minor">
+            <a:schemeClr val="lt1"/>
+          </a:fontRef>
+        </p:style>
+        <p:txBody>
+          <a:bodyPr rtlCol="0" anchor="ctr"/>
+          <a:lstStyle/>
+          <a:p>
+            <a:pPr algn="ctr"/>
+            <a:endParaRPr lang="en-US"/>
+          </a:p>
+        </p:txBody>
+      </p:sp>
+      <p:sp>
+        <p:nvSpPr>
+          <p:cNvPr id="23" name="TextBox 22">
+            <a:extLst>
+              <a:ext uri="{FF2B5EF4-FFF2-40B4-BE49-F238E27FC236}">
+                <a16:creationId xmlns:a16="http://schemas.microsoft.com/office/drawing/2014/main" id="{1601DE69-3C09-4B23-7642-8A3C3E4F6F5D}"/>
+              </a:ext>
+            </a:extLst>
+          </p:cNvPr>
+          <p:cNvSpPr txBox="1"/>
+          <p:nvPr/>
+        </p:nvSpPr>
+        <p:spPr>
+          <a:xfrm>
+            <a:off x="1143000" y="2963132"/>
+            <a:ext cx="597428" cy="307777"/>
+          </a:xfrm>
+          <a:prstGeom prst="rect">
+            <a:avLst/>
+          </a:prstGeom>
+          <a:solidFill>
+            <a:srgbClr val="FFFF00"/>
+          </a:solidFill>
+        </p:spPr>
+        <p:txBody>
+          <a:bodyPr wrap="square" rtlCol="0">
+            <a:spAutoFit/>
+          </a:bodyPr>
+          <a:lstStyle/>
+          <a:p>
+            <a:pPr algn="ctr"/>
+            <a:r>
+              <a:rPr lang="en-US" dirty="0"/>
+              <a:t>Icon</a:t>
+            </a:r>
+          </a:p>
+        </p:txBody>
+      </p:sp>
+      <p:cxnSp>
+        <p:nvCxnSpPr>
+          <p:cNvPr id="26" name="Connector: Curved 25">
+            <a:extLst>
+              <a:ext uri="{FF2B5EF4-FFF2-40B4-BE49-F238E27FC236}">
+                <a16:creationId xmlns:a16="http://schemas.microsoft.com/office/drawing/2014/main" id="{AEAB1444-7944-C35C-FA4B-CC05319C3B10}"/>
+              </a:ext>
+            </a:extLst>
+          </p:cNvPr>
+          <p:cNvCxnSpPr>
+            <a:endCxn id="20" idx="0"/>
+          </p:cNvCxnSpPr>
+          <p:nvPr/>
+        </p:nvCxnSpPr>
+        <p:spPr>
+          <a:xfrm>
+            <a:off x="1740428" y="3114675"/>
+            <a:ext cx="528904" cy="200025"/>
+          </a:xfrm>
+          <a:prstGeom prst="curvedConnector2">
+            <a:avLst/>
+          </a:prstGeom>
+          <a:ln>
+            <a:tailEnd type="triangle"/>
+          </a:ln>
+        </p:spPr>
+        <p:style>
+          <a:lnRef idx="1">
+            <a:schemeClr val="accent1"/>
+          </a:lnRef>
+          <a:fillRef idx="0">
+            <a:schemeClr val="accent1"/>
+          </a:fillRef>
+          <a:effectRef idx="0">
+            <a:schemeClr val="accent1"/>
+          </a:effectRef>
+          <a:fontRef idx="minor">
+            <a:schemeClr val="tx1"/>
+          </a:fontRef>
+        </p:style>
+      </p:cxnSp>
+      <p:sp>
+        <p:nvSpPr>
+          <p:cNvPr id="27" name="Rectangle: Rounded Corners 26">
+            <a:extLst>
+              <a:ext uri="{FF2B5EF4-FFF2-40B4-BE49-F238E27FC236}">
+                <a16:creationId xmlns:a16="http://schemas.microsoft.com/office/drawing/2014/main" id="{5040A9CA-C748-A0AE-3C01-437B1F8811AE}"/>
+              </a:ext>
+            </a:extLst>
+          </p:cNvPr>
+          <p:cNvSpPr/>
+          <p:nvPr/>
+        </p:nvSpPr>
+        <p:spPr>
+          <a:xfrm>
+            <a:off x="2495550" y="3314700"/>
+            <a:ext cx="1501513" cy="242888"/>
+          </a:xfrm>
+          <a:prstGeom prst="roundRect">
+            <a:avLst/>
+          </a:prstGeom>
+          <a:noFill/>
+          <a:ln>
+            <a:solidFill>
+              <a:srgbClr val="FF0000"/>
+            </a:solidFill>
+          </a:ln>
+        </p:spPr>
+        <p:style>
+          <a:lnRef idx="2">
+            <a:schemeClr val="accent1">
+              <a:shade val="15000"/>
+            </a:schemeClr>
+          </a:lnRef>
+          <a:fillRef idx="1">
+            <a:schemeClr val="accent1"/>
+          </a:fillRef>
+          <a:effectRef idx="0">
+            <a:schemeClr val="accent1"/>
+          </a:effectRef>
+          <a:fontRef idx="minor">
+            <a:schemeClr val="lt1"/>
+          </a:fontRef>
+        </p:style>
+        <p:txBody>
+          <a:bodyPr rtlCol="0" anchor="ctr"/>
+          <a:lstStyle/>
+          <a:p>
+            <a:pPr algn="ctr"/>
+            <a:endParaRPr lang="en-US"/>
+          </a:p>
+        </p:txBody>
+      </p:sp>
+      <p:sp>
+        <p:nvSpPr>
+          <p:cNvPr id="28" name="TextBox 27">
+            <a:extLst>
+              <a:ext uri="{FF2B5EF4-FFF2-40B4-BE49-F238E27FC236}">
+                <a16:creationId xmlns:a16="http://schemas.microsoft.com/office/drawing/2014/main" id="{195260C7-075C-87BE-6379-5CB3EA81324A}"/>
+              </a:ext>
+            </a:extLst>
+          </p:cNvPr>
+          <p:cNvSpPr txBox="1"/>
+          <p:nvPr/>
+        </p:nvSpPr>
+        <p:spPr>
+          <a:xfrm>
+            <a:off x="1096167" y="3499802"/>
+            <a:ext cx="676275" cy="307777"/>
+          </a:xfrm>
+          <a:prstGeom prst="rect">
+            <a:avLst/>
+          </a:prstGeom>
+          <a:solidFill>
+            <a:srgbClr val="FFFF00"/>
+          </a:solidFill>
+        </p:spPr>
+        <p:txBody>
+          <a:bodyPr wrap="square" rtlCol="0">
+            <a:spAutoFit/>
+          </a:bodyPr>
+          <a:lstStyle/>
+          <a:p>
+            <a:r>
+              <a:rPr lang="en-US" dirty="0"/>
+              <a:t>Name</a:t>
+            </a:r>
+          </a:p>
+        </p:txBody>
+      </p:sp>
+      <p:cxnSp>
+        <p:nvCxnSpPr>
+          <p:cNvPr id="30" name="Connector: Curved 29">
+            <a:extLst>
+              <a:ext uri="{FF2B5EF4-FFF2-40B4-BE49-F238E27FC236}">
+                <a16:creationId xmlns:a16="http://schemas.microsoft.com/office/drawing/2014/main" id="{F0B30673-2D60-1F9B-252D-FA879BC573FD}"/>
+              </a:ext>
+            </a:extLst>
+          </p:cNvPr>
+          <p:cNvCxnSpPr>
+            <a:stCxn id="28" idx="3"/>
+            <a:endCxn id="27" idx="2"/>
+          </p:cNvCxnSpPr>
+          <p:nvPr/>
+        </p:nvCxnSpPr>
+        <p:spPr>
+          <a:xfrm flipV="1">
+            <a:off x="1772442" y="3557588"/>
+            <a:ext cx="1473865" cy="96103"/>
+          </a:xfrm>
+          <a:prstGeom prst="curvedConnector2">
+            <a:avLst/>
+          </a:prstGeom>
+          <a:ln>
+            <a:tailEnd type="triangle"/>
+          </a:ln>
+        </p:spPr>
+        <p:style>
+          <a:lnRef idx="1">
+            <a:schemeClr val="accent1"/>
+          </a:lnRef>
+          <a:fillRef idx="0">
+            <a:schemeClr val="accent1"/>
+          </a:fillRef>
+          <a:effectRef idx="0">
+            <a:schemeClr val="accent1"/>
+          </a:effectRef>
+          <a:fontRef idx="minor">
+            <a:schemeClr val="tx1"/>
+          </a:fontRef>
+        </p:style>
+      </p:cxnSp>
+      <p:sp>
+        <p:nvSpPr>
+          <p:cNvPr id="31" name="Rectangle: Rounded Corners 30">
+            <a:extLst>
+              <a:ext uri="{FF2B5EF4-FFF2-40B4-BE49-F238E27FC236}">
+                <a16:creationId xmlns:a16="http://schemas.microsoft.com/office/drawing/2014/main" id="{25738E73-92F6-8467-BFFD-3E32385CCE24}"/>
+              </a:ext>
+            </a:extLst>
+          </p:cNvPr>
+          <p:cNvSpPr/>
+          <p:nvPr/>
+        </p:nvSpPr>
+        <p:spPr>
+          <a:xfrm>
+            <a:off x="4943475" y="3314700"/>
+            <a:ext cx="1728788" cy="242888"/>
+          </a:xfrm>
+          <a:prstGeom prst="roundRect">
+            <a:avLst/>
+          </a:prstGeom>
+          <a:noFill/>
+        </p:spPr>
+        <p:style>
+          <a:lnRef idx="2">
+            <a:schemeClr val="accent1">
+              <a:shade val="15000"/>
+            </a:schemeClr>
+          </a:lnRef>
+          <a:fillRef idx="1">
+            <a:schemeClr val="accent1"/>
+          </a:fillRef>
+          <a:effectRef idx="0">
+            <a:schemeClr val="accent1"/>
+          </a:effectRef>
+          <a:fontRef idx="minor">
+            <a:schemeClr val="lt1"/>
+          </a:fontRef>
+        </p:style>
+        <p:txBody>
+          <a:bodyPr rtlCol="0" anchor="ctr"/>
+          <a:lstStyle/>
+          <a:p>
+            <a:pPr algn="ctr"/>
+            <a:endParaRPr lang="en-US"/>
+          </a:p>
+        </p:txBody>
+      </p:sp>
+      <p:sp>
+        <p:nvSpPr>
+          <p:cNvPr id="32" name="TextBox 31">
+            <a:extLst>
+              <a:ext uri="{FF2B5EF4-FFF2-40B4-BE49-F238E27FC236}">
+                <a16:creationId xmlns:a16="http://schemas.microsoft.com/office/drawing/2014/main" id="{9040DCF4-990B-FE64-4048-397543F83FF7}"/>
+              </a:ext>
+            </a:extLst>
+          </p:cNvPr>
+          <p:cNvSpPr txBox="1"/>
+          <p:nvPr/>
+        </p:nvSpPr>
+        <p:spPr>
+          <a:xfrm>
+            <a:off x="4895850" y="2700338"/>
+            <a:ext cx="2057400" cy="307777"/>
+          </a:xfrm>
+          <a:prstGeom prst="rect">
+            <a:avLst/>
+          </a:prstGeom>
+          <a:solidFill>
+            <a:srgbClr val="FFFF00"/>
+          </a:solidFill>
+        </p:spPr>
+        <p:txBody>
+          <a:bodyPr wrap="square" rtlCol="0">
+            <a:spAutoFit/>
+          </a:bodyPr>
+          <a:lstStyle/>
+          <a:p>
+            <a:pPr algn="ctr"/>
+            <a:r>
+              <a:rPr lang="en-US" dirty="0"/>
+              <a:t>Action Recent</a:t>
+            </a:r>
+          </a:p>
+        </p:txBody>
+      </p:sp>
+      <p:cxnSp>
+        <p:nvCxnSpPr>
+          <p:cNvPr id="34" name="Connector: Curved 33">
+            <a:extLst>
+              <a:ext uri="{FF2B5EF4-FFF2-40B4-BE49-F238E27FC236}">
+                <a16:creationId xmlns:a16="http://schemas.microsoft.com/office/drawing/2014/main" id="{64613BAE-C75F-9604-9982-0A05FE94AF3B}"/>
+              </a:ext>
+            </a:extLst>
+          </p:cNvPr>
+          <p:cNvCxnSpPr>
+            <a:endCxn id="31" idx="0"/>
+          </p:cNvCxnSpPr>
+          <p:nvPr/>
+        </p:nvCxnSpPr>
+        <p:spPr>
+          <a:xfrm rot="5400000">
+            <a:off x="5710537" y="3105448"/>
+            <a:ext cx="306585" cy="111919"/>
+          </a:xfrm>
+          <a:prstGeom prst="curvedConnector3">
+            <a:avLst/>
+          </a:prstGeom>
+          <a:ln>
+            <a:tailEnd type="triangle"/>
+          </a:ln>
+        </p:spPr>
+        <p:style>
+          <a:lnRef idx="2">
+            <a:schemeClr val="dk1"/>
+          </a:lnRef>
+          <a:fillRef idx="0">
+            <a:schemeClr val="dk1"/>
+          </a:fillRef>
+          <a:effectRef idx="1">
+            <a:schemeClr val="dk1"/>
+          </a:effectRef>
+          <a:fontRef idx="minor">
+            <a:schemeClr val="tx1"/>
+          </a:fontRef>
+        </p:style>
+      </p:cxnSp>
+      <p:sp>
+        <p:nvSpPr>
+          <p:cNvPr id="35" name="Rectangle: Rounded Corners 34">
+            <a:extLst>
+              <a:ext uri="{FF2B5EF4-FFF2-40B4-BE49-F238E27FC236}">
+                <a16:creationId xmlns:a16="http://schemas.microsoft.com/office/drawing/2014/main" id="{C7670287-4AC5-5BCE-8753-B94B3F8EA4D7}"/>
+              </a:ext>
+            </a:extLst>
+          </p:cNvPr>
+          <p:cNvSpPr/>
+          <p:nvPr/>
+        </p:nvSpPr>
+        <p:spPr>
+          <a:xfrm>
+            <a:off x="7427119" y="3290888"/>
+            <a:ext cx="976312" cy="266700"/>
+          </a:xfrm>
+          <a:prstGeom prst="roundRect">
+            <a:avLst/>
+          </a:prstGeom>
+          <a:noFill/>
+        </p:spPr>
+        <p:style>
+          <a:lnRef idx="2">
+            <a:schemeClr val="accent1">
+              <a:shade val="15000"/>
+            </a:schemeClr>
+          </a:lnRef>
+          <a:fillRef idx="1">
+            <a:schemeClr val="accent1"/>
+          </a:fillRef>
+          <a:effectRef idx="0">
+            <a:schemeClr val="accent1"/>
+          </a:effectRef>
+          <a:fontRef idx="minor">
+            <a:schemeClr val="lt1"/>
+          </a:fontRef>
+        </p:style>
+        <p:txBody>
+          <a:bodyPr rtlCol="0" anchor="ctr"/>
+          <a:lstStyle/>
+          <a:p>
+            <a:pPr algn="ctr"/>
+            <a:endParaRPr lang="en-US"/>
+          </a:p>
+        </p:txBody>
+      </p:sp>
+      <p:sp>
+        <p:nvSpPr>
+          <p:cNvPr id="36" name="TextBox 35">
+            <a:extLst>
+              <a:ext uri="{FF2B5EF4-FFF2-40B4-BE49-F238E27FC236}">
+                <a16:creationId xmlns:a16="http://schemas.microsoft.com/office/drawing/2014/main" id="{C1591ACF-B1A8-378E-61BD-FAB458CCF105}"/>
+              </a:ext>
+            </a:extLst>
+          </p:cNvPr>
+          <p:cNvSpPr txBox="1"/>
+          <p:nvPr/>
+        </p:nvSpPr>
+        <p:spPr>
+          <a:xfrm>
+            <a:off x="7817645" y="2700338"/>
+            <a:ext cx="1076325" cy="307777"/>
+          </a:xfrm>
+          <a:prstGeom prst="rect">
+            <a:avLst/>
+          </a:prstGeom>
+          <a:solidFill>
+            <a:srgbClr val="FFFF00"/>
+          </a:solidFill>
+        </p:spPr>
+        <p:txBody>
+          <a:bodyPr wrap="square" rtlCol="0">
+            <a:spAutoFit/>
+          </a:bodyPr>
+          <a:lstStyle/>
+          <a:p>
+            <a:pPr algn="ctr"/>
+            <a:r>
+              <a:rPr lang="en-US" dirty="0"/>
+              <a:t>Owner</a:t>
+            </a:r>
+          </a:p>
+        </p:txBody>
+      </p:sp>
+      <p:cxnSp>
+        <p:nvCxnSpPr>
+          <p:cNvPr id="38" name="Connector: Curved 37">
+            <a:extLst>
+              <a:ext uri="{FF2B5EF4-FFF2-40B4-BE49-F238E27FC236}">
+                <a16:creationId xmlns:a16="http://schemas.microsoft.com/office/drawing/2014/main" id="{5E664B58-507D-6FEA-79B4-03B261C4442F}"/>
+              </a:ext>
+            </a:extLst>
+          </p:cNvPr>
+          <p:cNvCxnSpPr>
+            <a:endCxn id="35" idx="0"/>
+          </p:cNvCxnSpPr>
+          <p:nvPr/>
+        </p:nvCxnSpPr>
+        <p:spPr>
+          <a:xfrm rot="10800000" flipV="1">
+            <a:off x="7915276" y="3008114"/>
+            <a:ext cx="428625" cy="282773"/>
+          </a:xfrm>
+          <a:prstGeom prst="curvedConnector2">
+            <a:avLst/>
+          </a:prstGeom>
+          <a:ln>
+            <a:tailEnd type="triangle"/>
+          </a:ln>
+        </p:spPr>
+        <p:style>
+          <a:lnRef idx="2">
+            <a:schemeClr val="dk1"/>
+          </a:lnRef>
+          <a:fillRef idx="0">
+            <a:schemeClr val="dk1"/>
+          </a:fillRef>
+          <a:effectRef idx="1">
+            <a:schemeClr val="dk1"/>
+          </a:effectRef>
+          <a:fontRef idx="minor">
+            <a:schemeClr val="tx1"/>
+          </a:fontRef>
+        </p:style>
+      </p:cxnSp>
+      <p:sp>
+        <p:nvSpPr>
+          <p:cNvPr id="39" name="Rectangle: Rounded Corners 38">
+            <a:extLst>
+              <a:ext uri="{FF2B5EF4-FFF2-40B4-BE49-F238E27FC236}">
+                <a16:creationId xmlns:a16="http://schemas.microsoft.com/office/drawing/2014/main" id="{BF088B23-68D9-839F-9442-809157E989F5}"/>
+              </a:ext>
+            </a:extLst>
+          </p:cNvPr>
+          <p:cNvSpPr/>
+          <p:nvPr/>
+        </p:nvSpPr>
+        <p:spPr>
+          <a:xfrm>
+            <a:off x="8978900" y="3290888"/>
+            <a:ext cx="1231901" cy="306387"/>
+          </a:xfrm>
+          <a:prstGeom prst="roundRect">
+            <a:avLst/>
+          </a:prstGeom>
+          <a:noFill/>
+        </p:spPr>
+        <p:style>
+          <a:lnRef idx="2">
+            <a:schemeClr val="accent1">
+              <a:shade val="15000"/>
+            </a:schemeClr>
+          </a:lnRef>
+          <a:fillRef idx="1">
+            <a:schemeClr val="accent1"/>
+          </a:fillRef>
+          <a:effectRef idx="0">
+            <a:schemeClr val="accent1"/>
+          </a:effectRef>
+          <a:fontRef idx="minor">
+            <a:schemeClr val="lt1"/>
+          </a:fontRef>
+        </p:style>
+        <p:txBody>
+          <a:bodyPr rtlCol="0" anchor="ctr"/>
+          <a:lstStyle/>
+          <a:p>
+            <a:pPr algn="ctr"/>
+            <a:endParaRPr lang="en-US"/>
+          </a:p>
+        </p:txBody>
+      </p:sp>
+      <p:sp>
+        <p:nvSpPr>
+          <p:cNvPr id="40" name="TextBox 39">
+            <a:extLst>
+              <a:ext uri="{FF2B5EF4-FFF2-40B4-BE49-F238E27FC236}">
+                <a16:creationId xmlns:a16="http://schemas.microsoft.com/office/drawing/2014/main" id="{6B910EB5-1AC5-D5BC-B0BA-E9F6C7CD24B9}"/>
+              </a:ext>
+            </a:extLst>
+          </p:cNvPr>
+          <p:cNvSpPr txBox="1"/>
+          <p:nvPr/>
+        </p:nvSpPr>
+        <p:spPr>
+          <a:xfrm>
+            <a:off x="9578975" y="2700338"/>
+            <a:ext cx="866775" cy="307777"/>
+          </a:xfrm>
+          <a:prstGeom prst="rect">
+            <a:avLst/>
+          </a:prstGeom>
+          <a:solidFill>
+            <a:srgbClr val="FFFF00"/>
+          </a:solidFill>
+        </p:spPr>
+        <p:txBody>
+          <a:bodyPr wrap="square" rtlCol="0">
+            <a:spAutoFit/>
+          </a:bodyPr>
+          <a:lstStyle/>
+          <a:p>
+            <a:pPr algn="ctr"/>
+            <a:r>
+              <a:rPr lang="en-US" dirty="0"/>
+              <a:t>Folder</a:t>
+            </a:r>
+          </a:p>
+        </p:txBody>
+      </p:sp>
+      <p:cxnSp>
+        <p:nvCxnSpPr>
+          <p:cNvPr id="42" name="Connector: Curved 41">
+            <a:extLst>
+              <a:ext uri="{FF2B5EF4-FFF2-40B4-BE49-F238E27FC236}">
+                <a16:creationId xmlns:a16="http://schemas.microsoft.com/office/drawing/2014/main" id="{5ED84488-4050-131C-A64C-D7CA7DBBC280}"/>
+              </a:ext>
+            </a:extLst>
+          </p:cNvPr>
+          <p:cNvCxnSpPr>
+            <a:stCxn id="40" idx="2"/>
+            <a:endCxn id="39" idx="0"/>
+          </p:cNvCxnSpPr>
+          <p:nvPr/>
+        </p:nvCxnSpPr>
+        <p:spPr>
+          <a:xfrm rot="5400000">
+            <a:off x="9662221" y="2940745"/>
+            <a:ext cx="282773" cy="417512"/>
+          </a:xfrm>
+          <a:prstGeom prst="curvedConnector3">
+            <a:avLst/>
+          </a:prstGeom>
+          <a:ln>
+            <a:tailEnd type="triangle"/>
+          </a:ln>
+        </p:spPr>
+        <p:style>
+          <a:lnRef idx="2">
+            <a:schemeClr val="dk1"/>
+          </a:lnRef>
+          <a:fillRef idx="0">
+            <a:schemeClr val="dk1"/>
+          </a:fillRef>
+          <a:effectRef idx="1">
+            <a:schemeClr val="dk1"/>
+          </a:effectRef>
+          <a:fontRef idx="minor">
+            <a:schemeClr val="tx1"/>
+          </a:fontRef>
+        </p:style>
+      </p:cxnSp>
     </p:spTree>
     <p:extLst>
       <p:ext uri="{BB962C8B-B14F-4D97-AF65-F5344CB8AC3E}">
@@ -13078,7 +15049,7 @@
             </a:r>
             <a:r>
               <a:rPr lang="en-US" dirty="0" err="1"/>
-              <a:t>ActionLog</a:t>
+              <a:t>ActionRecent</a:t>
             </a:r>
             <a:r>
               <a:rPr lang="en-US" dirty="0"/>
@@ -13123,6 +15094,259 @@
           </a:fillRef>
           <a:effectRef idx="1">
             <a:schemeClr val="accent4"/>
+          </a:effectRef>
+          <a:fontRef idx="minor">
+            <a:schemeClr val="tx1"/>
+          </a:fontRef>
+        </p:style>
+      </p:cxnSp>
+      <p:sp>
+        <p:nvSpPr>
+          <p:cNvPr id="2" name="Flowchart: Connector 1">
+            <a:extLst>
+              <a:ext uri="{FF2B5EF4-FFF2-40B4-BE49-F238E27FC236}">
+                <a16:creationId xmlns:a16="http://schemas.microsoft.com/office/drawing/2014/main" id="{3EE5C671-16A2-57C1-CAC0-B2FBDAEC7E36}"/>
+              </a:ext>
+            </a:extLst>
+          </p:cNvPr>
+          <p:cNvSpPr/>
+          <p:nvPr/>
+        </p:nvSpPr>
+        <p:spPr>
+          <a:xfrm>
+            <a:off x="9613900" y="2622550"/>
+            <a:ext cx="317500" cy="374650"/>
+          </a:xfrm>
+          <a:prstGeom prst="flowChartConnector">
+            <a:avLst/>
+          </a:prstGeom>
+          <a:noFill/>
+        </p:spPr>
+        <p:style>
+          <a:lnRef idx="2">
+            <a:schemeClr val="accent1">
+              <a:shade val="15000"/>
+            </a:schemeClr>
+          </a:lnRef>
+          <a:fillRef idx="1">
+            <a:schemeClr val="accent1"/>
+          </a:fillRef>
+          <a:effectRef idx="0">
+            <a:schemeClr val="accent1"/>
+          </a:effectRef>
+          <a:fontRef idx="minor">
+            <a:schemeClr val="lt1"/>
+          </a:fontRef>
+        </p:style>
+        <p:txBody>
+          <a:bodyPr rtlCol="0" anchor="ctr"/>
+          <a:lstStyle/>
+          <a:p>
+            <a:pPr algn="ctr"/>
+            <a:endParaRPr lang="en-US"/>
+          </a:p>
+        </p:txBody>
+      </p:sp>
+      <p:sp>
+        <p:nvSpPr>
+          <p:cNvPr id="3" name="TextBox 2">
+            <a:extLst>
+              <a:ext uri="{FF2B5EF4-FFF2-40B4-BE49-F238E27FC236}">
+                <a16:creationId xmlns:a16="http://schemas.microsoft.com/office/drawing/2014/main" id="{9E3C8D91-C7E6-1E8C-748D-FAAC1CA5AFB8}"/>
+              </a:ext>
+            </a:extLst>
+          </p:cNvPr>
+          <p:cNvSpPr txBox="1"/>
+          <p:nvPr/>
+        </p:nvSpPr>
+        <p:spPr>
+          <a:xfrm>
+            <a:off x="8045450" y="1841500"/>
+            <a:ext cx="1206500" cy="307777"/>
+          </a:xfrm>
+          <a:prstGeom prst="rect">
+            <a:avLst/>
+          </a:prstGeom>
+          <a:solidFill>
+            <a:srgbClr val="FFFF00"/>
+          </a:solidFill>
+        </p:spPr>
+        <p:txBody>
+          <a:bodyPr wrap="square" rtlCol="0">
+            <a:spAutoFit/>
+          </a:bodyPr>
+          <a:lstStyle/>
+          <a:p>
+            <a:pPr algn="ctr"/>
+            <a:r>
+              <a:rPr lang="en-US" dirty="0"/>
+              <a:t>Avatar</a:t>
+            </a:r>
+          </a:p>
+        </p:txBody>
+      </p:sp>
+      <p:cxnSp>
+        <p:nvCxnSpPr>
+          <p:cNvPr id="8" name="Connector: Curved 7">
+            <a:extLst>
+              <a:ext uri="{FF2B5EF4-FFF2-40B4-BE49-F238E27FC236}">
+                <a16:creationId xmlns:a16="http://schemas.microsoft.com/office/drawing/2014/main" id="{385E76C6-EC4A-29D8-16B7-F292E758C0A8}"/>
+              </a:ext>
+            </a:extLst>
+          </p:cNvPr>
+          <p:cNvCxnSpPr>
+            <a:endCxn id="2" idx="0"/>
+          </p:cNvCxnSpPr>
+          <p:nvPr/>
+        </p:nvCxnSpPr>
+        <p:spPr>
+          <a:xfrm>
+            <a:off x="8648700" y="2149277"/>
+            <a:ext cx="1123950" cy="473273"/>
+          </a:xfrm>
+          <a:prstGeom prst="curvedConnector2">
+            <a:avLst/>
+          </a:prstGeom>
+          <a:ln>
+            <a:tailEnd type="triangle"/>
+          </a:ln>
+        </p:spPr>
+        <p:style>
+          <a:lnRef idx="1">
+            <a:schemeClr val="accent1"/>
+          </a:lnRef>
+          <a:fillRef idx="0">
+            <a:schemeClr val="accent1"/>
+          </a:fillRef>
+          <a:effectRef idx="0">
+            <a:schemeClr val="accent1"/>
+          </a:effectRef>
+          <a:fontRef idx="minor">
+            <a:schemeClr val="tx1"/>
+          </a:fontRef>
+        </p:style>
+      </p:cxnSp>
+      <p:sp>
+        <p:nvSpPr>
+          <p:cNvPr id="10" name="Rectangle: Rounded Corners 9">
+            <a:extLst>
+              <a:ext uri="{FF2B5EF4-FFF2-40B4-BE49-F238E27FC236}">
+                <a16:creationId xmlns:a16="http://schemas.microsoft.com/office/drawing/2014/main" id="{EACF7F51-D4CF-14BB-9D43-A885D33F26D9}"/>
+              </a:ext>
+            </a:extLst>
+          </p:cNvPr>
+          <p:cNvSpPr/>
+          <p:nvPr/>
+        </p:nvSpPr>
+        <p:spPr>
+          <a:xfrm>
+            <a:off x="10033000" y="2622550"/>
+            <a:ext cx="1250950" cy="933450"/>
+          </a:xfrm>
+          <a:prstGeom prst="roundRect">
+            <a:avLst/>
+          </a:prstGeom>
+          <a:noFill/>
+        </p:spPr>
+        <p:style>
+          <a:lnRef idx="2">
+            <a:schemeClr val="accent1">
+              <a:shade val="15000"/>
+            </a:schemeClr>
+          </a:lnRef>
+          <a:fillRef idx="1">
+            <a:schemeClr val="accent1"/>
+          </a:fillRef>
+          <a:effectRef idx="0">
+            <a:schemeClr val="accent1"/>
+          </a:effectRef>
+          <a:fontRef idx="minor">
+            <a:schemeClr val="lt1"/>
+          </a:fontRef>
+        </p:style>
+        <p:txBody>
+          <a:bodyPr rtlCol="0" anchor="ctr"/>
+          <a:lstStyle/>
+          <a:p>
+            <a:pPr algn="ctr"/>
+            <a:endParaRPr lang="en-US"/>
+          </a:p>
+        </p:txBody>
+      </p:sp>
+      <p:sp>
+        <p:nvSpPr>
+          <p:cNvPr id="11" name="TextBox 10">
+            <a:extLst>
+              <a:ext uri="{FF2B5EF4-FFF2-40B4-BE49-F238E27FC236}">
+                <a16:creationId xmlns:a16="http://schemas.microsoft.com/office/drawing/2014/main" id="{5FE6C765-5D0D-322E-2D65-85007D39446B}"/>
+              </a:ext>
+            </a:extLst>
+          </p:cNvPr>
+          <p:cNvSpPr txBox="1"/>
+          <p:nvPr/>
+        </p:nvSpPr>
+        <p:spPr>
+          <a:xfrm>
+            <a:off x="6839458" y="2655986"/>
+            <a:ext cx="1587500" cy="307777"/>
+          </a:xfrm>
+          <a:prstGeom prst="rect">
+            <a:avLst/>
+          </a:prstGeom>
+          <a:solidFill>
+            <a:srgbClr val="FFFF00"/>
+          </a:solidFill>
+        </p:spPr>
+        <p:txBody>
+          <a:bodyPr wrap="square" rtlCol="0">
+            <a:spAutoFit/>
+          </a:bodyPr>
+          <a:lstStyle/>
+          <a:p>
+            <a:pPr algn="ctr"/>
+            <a:r>
+              <a:rPr lang="en-US" dirty="0"/>
+              <a:t>Action Recent</a:t>
+            </a:r>
+          </a:p>
+        </p:txBody>
+      </p:sp>
+      <p:cxnSp>
+        <p:nvCxnSpPr>
+          <p:cNvPr id="13" name="Connector: Curved 12">
+            <a:extLst>
+              <a:ext uri="{FF2B5EF4-FFF2-40B4-BE49-F238E27FC236}">
+                <a16:creationId xmlns:a16="http://schemas.microsoft.com/office/drawing/2014/main" id="{E235CDD3-2F1F-E488-8183-0D71084D27F3}"/>
+              </a:ext>
+            </a:extLst>
+          </p:cNvPr>
+          <p:cNvCxnSpPr>
+            <a:stCxn id="11" idx="3"/>
+            <a:endCxn id="10" idx="1"/>
+          </p:cNvCxnSpPr>
+          <p:nvPr/>
+        </p:nvCxnSpPr>
+        <p:spPr>
+          <a:xfrm>
+            <a:off x="8426958" y="2809875"/>
+            <a:ext cx="1606042" cy="279400"/>
+          </a:xfrm>
+          <a:prstGeom prst="curvedConnector3">
+            <a:avLst/>
+          </a:prstGeom>
+          <a:ln>
+            <a:tailEnd type="triangle"/>
+          </a:ln>
+        </p:spPr>
+        <p:style>
+          <a:lnRef idx="1">
+            <a:schemeClr val="accent1"/>
+          </a:lnRef>
+          <a:fillRef idx="0">
+            <a:schemeClr val="accent1"/>
+          </a:fillRef>
+          <a:effectRef idx="0">
+            <a:schemeClr val="accent1"/>
           </a:effectRef>
           <a:fontRef idx="minor">
             <a:schemeClr val="tx1"/>
@@ -13497,6 +15721,396 @@
           </a:fontRef>
         </p:style>
       </p:cxnSp>
+      <p:sp>
+        <p:nvSpPr>
+          <p:cNvPr id="2" name="Rectangle 1">
+            <a:extLst>
+              <a:ext uri="{FF2B5EF4-FFF2-40B4-BE49-F238E27FC236}">
+                <a16:creationId xmlns:a16="http://schemas.microsoft.com/office/drawing/2014/main" id="{142CB51E-D3AC-904B-10B0-05FD509A40D4}"/>
+              </a:ext>
+            </a:extLst>
+          </p:cNvPr>
+          <p:cNvSpPr/>
+          <p:nvPr/>
+        </p:nvSpPr>
+        <p:spPr>
+          <a:xfrm>
+            <a:off x="1810512" y="1325880"/>
+            <a:ext cx="548640" cy="237744"/>
+          </a:xfrm>
+          <a:prstGeom prst="rect">
+            <a:avLst/>
+          </a:prstGeom>
+          <a:noFill/>
+        </p:spPr>
+        <p:style>
+          <a:lnRef idx="2">
+            <a:schemeClr val="accent1">
+              <a:shade val="15000"/>
+            </a:schemeClr>
+          </a:lnRef>
+          <a:fillRef idx="1">
+            <a:schemeClr val="accent1"/>
+          </a:fillRef>
+          <a:effectRef idx="0">
+            <a:schemeClr val="accent1"/>
+          </a:effectRef>
+          <a:fontRef idx="minor">
+            <a:schemeClr val="lt1"/>
+          </a:fontRef>
+        </p:style>
+        <p:txBody>
+          <a:bodyPr rtlCol="0" anchor="ctr"/>
+          <a:lstStyle/>
+          <a:p>
+            <a:pPr algn="ctr"/>
+            <a:endParaRPr lang="en-US"/>
+          </a:p>
+        </p:txBody>
+      </p:sp>
+      <p:sp>
+        <p:nvSpPr>
+          <p:cNvPr id="3" name="TextBox 2">
+            <a:extLst>
+              <a:ext uri="{FF2B5EF4-FFF2-40B4-BE49-F238E27FC236}">
+                <a16:creationId xmlns:a16="http://schemas.microsoft.com/office/drawing/2014/main" id="{FC50DC63-C0D3-A121-D1F0-7B403ED97A96}"/>
+              </a:ext>
+            </a:extLst>
+          </p:cNvPr>
+          <p:cNvSpPr txBox="1"/>
+          <p:nvPr/>
+        </p:nvSpPr>
+        <p:spPr>
+          <a:xfrm>
+            <a:off x="1810512" y="177301"/>
+            <a:ext cx="1444752" cy="307777"/>
+          </a:xfrm>
+          <a:prstGeom prst="rect">
+            <a:avLst/>
+          </a:prstGeom>
+          <a:solidFill>
+            <a:srgbClr val="FFFF00"/>
+          </a:solidFill>
+        </p:spPr>
+        <p:txBody>
+          <a:bodyPr wrap="square" rtlCol="0">
+            <a:spAutoFit/>
+          </a:bodyPr>
+          <a:lstStyle/>
+          <a:p>
+            <a:r>
+              <a:rPr lang="en-US" dirty="0"/>
+              <a:t>Sort by Filetype</a:t>
+            </a:r>
+          </a:p>
+        </p:txBody>
+      </p:sp>
+      <p:cxnSp>
+        <p:nvCxnSpPr>
+          <p:cNvPr id="8" name="Straight Arrow Connector 7">
+            <a:extLst>
+              <a:ext uri="{FF2B5EF4-FFF2-40B4-BE49-F238E27FC236}">
+                <a16:creationId xmlns:a16="http://schemas.microsoft.com/office/drawing/2014/main" id="{E640C867-D2FF-DAF5-BEB1-C5C5CCFDBA98}"/>
+              </a:ext>
+            </a:extLst>
+          </p:cNvPr>
+          <p:cNvCxnSpPr>
+            <a:stCxn id="3" idx="2"/>
+            <a:endCxn id="2" idx="0"/>
+          </p:cNvCxnSpPr>
+          <p:nvPr/>
+        </p:nvCxnSpPr>
+        <p:spPr>
+          <a:xfrm flipH="1">
+            <a:off x="2084832" y="485078"/>
+            <a:ext cx="448056" cy="840802"/>
+          </a:xfrm>
+          <a:prstGeom prst="straightConnector1">
+            <a:avLst/>
+          </a:prstGeom>
+          <a:ln>
+            <a:tailEnd type="triangle"/>
+          </a:ln>
+        </p:spPr>
+        <p:style>
+          <a:lnRef idx="2">
+            <a:schemeClr val="accent4"/>
+          </a:lnRef>
+          <a:fillRef idx="0">
+            <a:schemeClr val="accent4"/>
+          </a:fillRef>
+          <a:effectRef idx="1">
+            <a:schemeClr val="accent4"/>
+          </a:effectRef>
+          <a:fontRef idx="minor">
+            <a:schemeClr val="tx1"/>
+          </a:fontRef>
+        </p:style>
+      </p:cxnSp>
+      <p:sp>
+        <p:nvSpPr>
+          <p:cNvPr id="10" name="Rectangle 9">
+            <a:extLst>
+              <a:ext uri="{FF2B5EF4-FFF2-40B4-BE49-F238E27FC236}">
+                <a16:creationId xmlns:a16="http://schemas.microsoft.com/office/drawing/2014/main" id="{8B65097A-E467-CBB4-C651-82A8DA224A77}"/>
+              </a:ext>
+            </a:extLst>
+          </p:cNvPr>
+          <p:cNvSpPr/>
+          <p:nvPr/>
+        </p:nvSpPr>
+        <p:spPr>
+          <a:xfrm>
+            <a:off x="2372868" y="1325880"/>
+            <a:ext cx="694944" cy="237744"/>
+          </a:xfrm>
+          <a:prstGeom prst="rect">
+            <a:avLst/>
+          </a:prstGeom>
+          <a:noFill/>
+          <a:ln>
+            <a:solidFill>
+              <a:srgbClr val="FFC000"/>
+            </a:solidFill>
+          </a:ln>
+        </p:spPr>
+        <p:style>
+          <a:lnRef idx="2">
+            <a:schemeClr val="accent1">
+              <a:shade val="15000"/>
+            </a:schemeClr>
+          </a:lnRef>
+          <a:fillRef idx="1">
+            <a:schemeClr val="accent1"/>
+          </a:fillRef>
+          <a:effectRef idx="0">
+            <a:schemeClr val="accent1"/>
+          </a:effectRef>
+          <a:fontRef idx="minor">
+            <a:schemeClr val="lt1"/>
+          </a:fontRef>
+        </p:style>
+        <p:txBody>
+          <a:bodyPr rtlCol="0" anchor="ctr"/>
+          <a:lstStyle/>
+          <a:p>
+            <a:pPr algn="ctr"/>
+            <a:endParaRPr lang="en-US"/>
+          </a:p>
+        </p:txBody>
+      </p:sp>
+      <p:sp>
+        <p:nvSpPr>
+          <p:cNvPr id="11" name="TextBox 10">
+            <a:extLst>
+              <a:ext uri="{FF2B5EF4-FFF2-40B4-BE49-F238E27FC236}">
+                <a16:creationId xmlns:a16="http://schemas.microsoft.com/office/drawing/2014/main" id="{F51F314C-ABC2-16CA-9A2E-D403BE06227A}"/>
+              </a:ext>
+            </a:extLst>
+          </p:cNvPr>
+          <p:cNvSpPr txBox="1"/>
+          <p:nvPr/>
+        </p:nvSpPr>
+        <p:spPr>
+          <a:xfrm>
+            <a:off x="3465576" y="177301"/>
+            <a:ext cx="1335024" cy="307777"/>
+          </a:xfrm>
+          <a:prstGeom prst="rect">
+            <a:avLst/>
+          </a:prstGeom>
+          <a:solidFill>
+            <a:srgbClr val="FFFF00"/>
+          </a:solidFill>
+        </p:spPr>
+        <p:txBody>
+          <a:bodyPr wrap="square" rtlCol="0">
+            <a:spAutoFit/>
+          </a:bodyPr>
+          <a:lstStyle/>
+          <a:p>
+            <a:r>
+              <a:rPr lang="en-US" dirty="0"/>
+              <a:t>Sort by Owner</a:t>
+            </a:r>
+          </a:p>
+        </p:txBody>
+      </p:sp>
+      <p:cxnSp>
+        <p:nvCxnSpPr>
+          <p:cNvPr id="13" name="Straight Arrow Connector 12">
+            <a:extLst>
+              <a:ext uri="{FF2B5EF4-FFF2-40B4-BE49-F238E27FC236}">
+                <a16:creationId xmlns:a16="http://schemas.microsoft.com/office/drawing/2014/main" id="{E6AFB5B1-DE8A-74B4-4FD9-5F7838E827C3}"/>
+              </a:ext>
+            </a:extLst>
+          </p:cNvPr>
+          <p:cNvCxnSpPr>
+            <a:endCxn id="10" idx="0"/>
+          </p:cNvCxnSpPr>
+          <p:nvPr/>
+        </p:nvCxnSpPr>
+        <p:spPr>
+          <a:xfrm flipH="1">
+            <a:off x="2720340" y="485078"/>
+            <a:ext cx="1403604" cy="840802"/>
+          </a:xfrm>
+          <a:prstGeom prst="straightConnector1">
+            <a:avLst/>
+          </a:prstGeom>
+          <a:ln>
+            <a:tailEnd type="triangle"/>
+          </a:ln>
+        </p:spPr>
+        <p:style>
+          <a:lnRef idx="2">
+            <a:schemeClr val="accent4"/>
+          </a:lnRef>
+          <a:fillRef idx="0">
+            <a:schemeClr val="accent4"/>
+          </a:fillRef>
+          <a:effectRef idx="1">
+            <a:schemeClr val="accent4"/>
+          </a:effectRef>
+          <a:fontRef idx="minor">
+            <a:schemeClr val="tx1"/>
+          </a:fontRef>
+        </p:style>
+      </p:cxnSp>
+      <p:sp>
+        <p:nvSpPr>
+          <p:cNvPr id="14" name="Rectangle 13">
+            <a:extLst>
+              <a:ext uri="{FF2B5EF4-FFF2-40B4-BE49-F238E27FC236}">
+                <a16:creationId xmlns:a16="http://schemas.microsoft.com/office/drawing/2014/main" id="{81BC83E2-78E5-7650-CA44-8A35D0798864}"/>
+              </a:ext>
+            </a:extLst>
+          </p:cNvPr>
+          <p:cNvSpPr/>
+          <p:nvPr/>
+        </p:nvSpPr>
+        <p:spPr>
+          <a:xfrm>
+            <a:off x="3067812" y="1325880"/>
+            <a:ext cx="1485900" cy="237744"/>
+          </a:xfrm>
+          <a:prstGeom prst="rect">
+            <a:avLst/>
+          </a:prstGeom>
+          <a:noFill/>
+          <a:ln>
+            <a:solidFill>
+              <a:schemeClr val="accent1">
+                <a:lumMod val="75000"/>
+              </a:schemeClr>
+            </a:solidFill>
+          </a:ln>
+        </p:spPr>
+        <p:style>
+          <a:lnRef idx="2">
+            <a:schemeClr val="accent1">
+              <a:shade val="15000"/>
+            </a:schemeClr>
+          </a:lnRef>
+          <a:fillRef idx="1">
+            <a:schemeClr val="accent1"/>
+          </a:fillRef>
+          <a:effectRef idx="0">
+            <a:schemeClr val="accent1"/>
+          </a:effectRef>
+          <a:fontRef idx="minor">
+            <a:schemeClr val="lt1"/>
+          </a:fontRef>
+        </p:style>
+        <p:txBody>
+          <a:bodyPr rtlCol="0" anchor="ctr"/>
+          <a:lstStyle/>
+          <a:p>
+            <a:pPr algn="ctr"/>
+            <a:endParaRPr lang="en-US"/>
+          </a:p>
+        </p:txBody>
+      </p:sp>
+      <p:sp>
+        <p:nvSpPr>
+          <p:cNvPr id="15" name="TextBox 14">
+            <a:extLst>
+              <a:ext uri="{FF2B5EF4-FFF2-40B4-BE49-F238E27FC236}">
+                <a16:creationId xmlns:a16="http://schemas.microsoft.com/office/drawing/2014/main" id="{BC0DDB59-38A4-C8E0-1F77-32E9CA637AB3}"/>
+              </a:ext>
+            </a:extLst>
+          </p:cNvPr>
+          <p:cNvSpPr txBox="1"/>
+          <p:nvPr/>
+        </p:nvSpPr>
+        <p:spPr>
+          <a:xfrm>
+            <a:off x="4893564" y="190010"/>
+            <a:ext cx="2057400" cy="307777"/>
+          </a:xfrm>
+          <a:prstGeom prst="rect">
+            <a:avLst/>
+          </a:prstGeom>
+          <a:solidFill>
+            <a:srgbClr val="FFFF00"/>
+          </a:solidFill>
+        </p:spPr>
+        <p:txBody>
+          <a:bodyPr wrap="square" rtlCol="0">
+            <a:spAutoFit/>
+          </a:bodyPr>
+          <a:lstStyle/>
+          <a:p>
+            <a:r>
+              <a:rPr lang="en-US" dirty="0"/>
+              <a:t>Sort by Action Recent</a:t>
+            </a:r>
+          </a:p>
+        </p:txBody>
+      </p:sp>
+      <p:cxnSp>
+        <p:nvCxnSpPr>
+          <p:cNvPr id="17" name="Straight Arrow Connector 16">
+            <a:extLst>
+              <a:ext uri="{FF2B5EF4-FFF2-40B4-BE49-F238E27FC236}">
+                <a16:creationId xmlns:a16="http://schemas.microsoft.com/office/drawing/2014/main" id="{6D056940-FE88-5368-D025-97CB8E52C21B}"/>
+              </a:ext>
+            </a:extLst>
+          </p:cNvPr>
+          <p:cNvCxnSpPr>
+            <a:cxnSpLocks/>
+            <a:stCxn id="15" idx="2"/>
+            <a:endCxn id="14" idx="0"/>
+          </p:cNvCxnSpPr>
+          <p:nvPr/>
+        </p:nvCxnSpPr>
+        <p:spPr>
+          <a:xfrm flipH="1">
+            <a:off x="3810762" y="497787"/>
+            <a:ext cx="2111502" cy="828093"/>
+          </a:xfrm>
+          <a:prstGeom prst="straightConnector1">
+            <a:avLst/>
+          </a:prstGeom>
+          <a:ln>
+            <a:tailEnd type="triangle"/>
+          </a:ln>
+        </p:spPr>
+        <p:style>
+          <a:lnRef idx="2">
+            <a:schemeClr val="accent4"/>
+          </a:lnRef>
+          <a:fillRef idx="0">
+            <a:schemeClr val="accent4"/>
+          </a:fillRef>
+          <a:effectRef idx="1">
+            <a:schemeClr val="accent4"/>
+          </a:effectRef>
+          <a:fontRef idx="minor">
+            <a:schemeClr val="tx1"/>
+          </a:fontRef>
+        </p:style>
+      </p:cxnSp>
     </p:spTree>
     <p:extLst>
       <p:ext uri="{BB962C8B-B14F-4D97-AF65-F5344CB8AC3E}">
@@ -14034,6 +16648,645 @@
             <a:ext cx="2215896" cy="2060519"/>
           </a:xfrm>
           <a:prstGeom prst="straightConnector1">
+            <a:avLst/>
+          </a:prstGeom>
+          <a:ln>
+            <a:tailEnd type="triangle"/>
+          </a:ln>
+        </p:spPr>
+        <p:style>
+          <a:lnRef idx="1">
+            <a:schemeClr val="accent1"/>
+          </a:lnRef>
+          <a:fillRef idx="0">
+            <a:schemeClr val="accent1"/>
+          </a:fillRef>
+          <a:effectRef idx="0">
+            <a:schemeClr val="accent1"/>
+          </a:effectRef>
+          <a:fontRef idx="minor">
+            <a:schemeClr val="tx1"/>
+          </a:fontRef>
+        </p:style>
+      </p:cxnSp>
+      <p:sp>
+        <p:nvSpPr>
+          <p:cNvPr id="2" name="Rectangle: Rounded Corners 1">
+            <a:extLst>
+              <a:ext uri="{FF2B5EF4-FFF2-40B4-BE49-F238E27FC236}">
+                <a16:creationId xmlns:a16="http://schemas.microsoft.com/office/drawing/2014/main" id="{DD165C11-7A06-0F98-8F46-2CEFBD031FF8}"/>
+              </a:ext>
+            </a:extLst>
+          </p:cNvPr>
+          <p:cNvSpPr/>
+          <p:nvPr/>
+        </p:nvSpPr>
+        <p:spPr>
+          <a:xfrm>
+            <a:off x="1873250" y="3568700"/>
+            <a:ext cx="234950" cy="222250"/>
+          </a:xfrm>
+          <a:prstGeom prst="roundRect">
+            <a:avLst/>
+          </a:prstGeom>
+          <a:noFill/>
+        </p:spPr>
+        <p:style>
+          <a:lnRef idx="2">
+            <a:schemeClr val="accent1">
+              <a:shade val="15000"/>
+            </a:schemeClr>
+          </a:lnRef>
+          <a:fillRef idx="1">
+            <a:schemeClr val="accent1"/>
+          </a:fillRef>
+          <a:effectRef idx="0">
+            <a:schemeClr val="accent1"/>
+          </a:effectRef>
+          <a:fontRef idx="minor">
+            <a:schemeClr val="lt1"/>
+          </a:fontRef>
+        </p:style>
+        <p:txBody>
+          <a:bodyPr rtlCol="0" anchor="ctr"/>
+          <a:lstStyle/>
+          <a:p>
+            <a:pPr algn="ctr"/>
+            <a:endParaRPr lang="en-US"/>
+          </a:p>
+        </p:txBody>
+      </p:sp>
+      <p:sp>
+        <p:nvSpPr>
+          <p:cNvPr id="3" name="TextBox 2">
+            <a:extLst>
+              <a:ext uri="{FF2B5EF4-FFF2-40B4-BE49-F238E27FC236}">
+                <a16:creationId xmlns:a16="http://schemas.microsoft.com/office/drawing/2014/main" id="{10AD0E44-4596-38C6-0893-745E0E9DC01C}"/>
+              </a:ext>
+            </a:extLst>
+          </p:cNvPr>
+          <p:cNvSpPr txBox="1"/>
+          <p:nvPr/>
+        </p:nvSpPr>
+        <p:spPr>
+          <a:xfrm>
+            <a:off x="2908300" y="3054350"/>
+            <a:ext cx="774700" cy="307777"/>
+          </a:xfrm>
+          <a:prstGeom prst="rect">
+            <a:avLst/>
+          </a:prstGeom>
+          <a:solidFill>
+            <a:srgbClr val="FFFF00"/>
+          </a:solidFill>
+        </p:spPr>
+        <p:txBody>
+          <a:bodyPr wrap="square" rtlCol="0">
+            <a:spAutoFit/>
+          </a:bodyPr>
+          <a:lstStyle/>
+          <a:p>
+            <a:pPr algn="ctr"/>
+            <a:r>
+              <a:rPr lang="en-US" dirty="0"/>
+              <a:t>Icon</a:t>
+            </a:r>
+          </a:p>
+        </p:txBody>
+      </p:sp>
+      <p:cxnSp>
+        <p:nvCxnSpPr>
+          <p:cNvPr id="8" name="Connector: Curved 7">
+            <a:extLst>
+              <a:ext uri="{FF2B5EF4-FFF2-40B4-BE49-F238E27FC236}">
+                <a16:creationId xmlns:a16="http://schemas.microsoft.com/office/drawing/2014/main" id="{ED11C0D9-D3B5-54F1-EFC6-EB87ADA5F17E}"/>
+              </a:ext>
+            </a:extLst>
+          </p:cNvPr>
+          <p:cNvCxnSpPr>
+            <a:stCxn id="3" idx="2"/>
+            <a:endCxn id="2" idx="0"/>
+          </p:cNvCxnSpPr>
+          <p:nvPr/>
+        </p:nvCxnSpPr>
+        <p:spPr>
+          <a:xfrm rot="5400000">
+            <a:off x="2539902" y="2812951"/>
+            <a:ext cx="206573" cy="1304925"/>
+          </a:xfrm>
+          <a:prstGeom prst="curvedConnector3">
+            <a:avLst/>
+          </a:prstGeom>
+          <a:ln>
+            <a:tailEnd type="triangle"/>
+          </a:ln>
+        </p:spPr>
+        <p:style>
+          <a:lnRef idx="1">
+            <a:schemeClr val="accent1"/>
+          </a:lnRef>
+          <a:fillRef idx="0">
+            <a:schemeClr val="accent1"/>
+          </a:fillRef>
+          <a:effectRef idx="0">
+            <a:schemeClr val="accent1"/>
+          </a:effectRef>
+          <a:fontRef idx="minor">
+            <a:schemeClr val="tx1"/>
+          </a:fontRef>
+        </p:style>
+      </p:cxnSp>
+      <p:sp>
+        <p:nvSpPr>
+          <p:cNvPr id="10" name="Rectangle: Rounded Corners 9">
+            <a:extLst>
+              <a:ext uri="{FF2B5EF4-FFF2-40B4-BE49-F238E27FC236}">
+                <a16:creationId xmlns:a16="http://schemas.microsoft.com/office/drawing/2014/main" id="{AFBE187D-2AFA-85B8-5CCC-46759AB6CD44}"/>
+              </a:ext>
+            </a:extLst>
+          </p:cNvPr>
+          <p:cNvSpPr/>
+          <p:nvPr/>
+        </p:nvSpPr>
+        <p:spPr>
+          <a:xfrm>
+            <a:off x="2171700" y="3568700"/>
+            <a:ext cx="1079500" cy="206574"/>
+          </a:xfrm>
+          <a:prstGeom prst="roundRect">
+            <a:avLst/>
+          </a:prstGeom>
+          <a:noFill/>
+          <a:ln>
+            <a:solidFill>
+              <a:srgbClr val="FF0000"/>
+            </a:solidFill>
+          </a:ln>
+        </p:spPr>
+        <p:style>
+          <a:lnRef idx="2">
+            <a:schemeClr val="accent1">
+              <a:shade val="15000"/>
+            </a:schemeClr>
+          </a:lnRef>
+          <a:fillRef idx="1">
+            <a:schemeClr val="accent1"/>
+          </a:fillRef>
+          <a:effectRef idx="0">
+            <a:schemeClr val="accent1"/>
+          </a:effectRef>
+          <a:fontRef idx="minor">
+            <a:schemeClr val="lt1"/>
+          </a:fontRef>
+        </p:style>
+        <p:txBody>
+          <a:bodyPr rtlCol="0" anchor="ctr"/>
+          <a:lstStyle/>
+          <a:p>
+            <a:pPr algn="ctr"/>
+            <a:endParaRPr lang="en-US"/>
+          </a:p>
+        </p:txBody>
+      </p:sp>
+      <p:sp>
+        <p:nvSpPr>
+          <p:cNvPr id="11" name="TextBox 10">
+            <a:extLst>
+              <a:ext uri="{FF2B5EF4-FFF2-40B4-BE49-F238E27FC236}">
+                <a16:creationId xmlns:a16="http://schemas.microsoft.com/office/drawing/2014/main" id="{5F58DA8E-D307-0CB8-2C92-B142DCF88C7F}"/>
+              </a:ext>
+            </a:extLst>
+          </p:cNvPr>
+          <p:cNvSpPr txBox="1"/>
+          <p:nvPr/>
+        </p:nvSpPr>
+        <p:spPr>
+          <a:xfrm>
+            <a:off x="3962400" y="3054350"/>
+            <a:ext cx="717550" cy="307777"/>
+          </a:xfrm>
+          <a:prstGeom prst="rect">
+            <a:avLst/>
+          </a:prstGeom>
+          <a:solidFill>
+            <a:srgbClr val="FFFF00"/>
+          </a:solidFill>
+        </p:spPr>
+        <p:txBody>
+          <a:bodyPr wrap="square" rtlCol="0">
+            <a:spAutoFit/>
+          </a:bodyPr>
+          <a:lstStyle/>
+          <a:p>
+            <a:pPr algn="ctr"/>
+            <a:r>
+              <a:rPr lang="en-US" dirty="0"/>
+              <a:t>Name</a:t>
+            </a:r>
+          </a:p>
+        </p:txBody>
+      </p:sp>
+      <p:cxnSp>
+        <p:nvCxnSpPr>
+          <p:cNvPr id="13" name="Connector: Curved 12">
+            <a:extLst>
+              <a:ext uri="{FF2B5EF4-FFF2-40B4-BE49-F238E27FC236}">
+                <a16:creationId xmlns:a16="http://schemas.microsoft.com/office/drawing/2014/main" id="{D57D1D24-6AB4-32F1-23A6-6A0015002EEA}"/>
+              </a:ext>
+            </a:extLst>
+          </p:cNvPr>
+          <p:cNvCxnSpPr>
+            <a:endCxn id="10" idx="3"/>
+          </p:cNvCxnSpPr>
+          <p:nvPr/>
+        </p:nvCxnSpPr>
+        <p:spPr>
+          <a:xfrm rot="10800000" flipV="1">
+            <a:off x="3251200" y="3362127"/>
+            <a:ext cx="1092200" cy="309860"/>
+          </a:xfrm>
+          <a:prstGeom prst="curvedConnector3">
+            <a:avLst/>
+          </a:prstGeom>
+          <a:ln>
+            <a:tailEnd type="triangle"/>
+          </a:ln>
+        </p:spPr>
+        <p:style>
+          <a:lnRef idx="1">
+            <a:schemeClr val="accent1"/>
+          </a:lnRef>
+          <a:fillRef idx="0">
+            <a:schemeClr val="accent1"/>
+          </a:fillRef>
+          <a:effectRef idx="0">
+            <a:schemeClr val="accent1"/>
+          </a:effectRef>
+          <a:fontRef idx="minor">
+            <a:schemeClr val="tx1"/>
+          </a:fontRef>
+        </p:style>
+      </p:cxnSp>
+      <p:sp>
+        <p:nvSpPr>
+          <p:cNvPr id="14" name="Rectangle: Rounded Corners 13">
+            <a:extLst>
+              <a:ext uri="{FF2B5EF4-FFF2-40B4-BE49-F238E27FC236}">
+                <a16:creationId xmlns:a16="http://schemas.microsoft.com/office/drawing/2014/main" id="{D3D4DA8C-2159-0435-2EEA-6521C7C791E5}"/>
+              </a:ext>
+            </a:extLst>
+          </p:cNvPr>
+          <p:cNvSpPr/>
+          <p:nvPr/>
+        </p:nvSpPr>
+        <p:spPr>
+          <a:xfrm>
+            <a:off x="5880100" y="3511550"/>
+            <a:ext cx="514350" cy="309861"/>
+          </a:xfrm>
+          <a:prstGeom prst="roundRect">
+            <a:avLst/>
+          </a:prstGeom>
+          <a:noFill/>
+        </p:spPr>
+        <p:style>
+          <a:lnRef idx="2">
+            <a:schemeClr val="accent1">
+              <a:shade val="15000"/>
+            </a:schemeClr>
+          </a:lnRef>
+          <a:fillRef idx="1">
+            <a:schemeClr val="accent1"/>
+          </a:fillRef>
+          <a:effectRef idx="0">
+            <a:schemeClr val="accent1"/>
+          </a:effectRef>
+          <a:fontRef idx="minor">
+            <a:schemeClr val="lt1"/>
+          </a:fontRef>
+        </p:style>
+        <p:txBody>
+          <a:bodyPr rtlCol="0" anchor="ctr"/>
+          <a:lstStyle/>
+          <a:p>
+            <a:pPr algn="ctr"/>
+            <a:endParaRPr lang="en-US"/>
+          </a:p>
+        </p:txBody>
+      </p:sp>
+      <p:sp>
+        <p:nvSpPr>
+          <p:cNvPr id="15" name="TextBox 14">
+            <a:extLst>
+              <a:ext uri="{FF2B5EF4-FFF2-40B4-BE49-F238E27FC236}">
+                <a16:creationId xmlns:a16="http://schemas.microsoft.com/office/drawing/2014/main" id="{18AED67F-274A-1232-A4B8-9BF9FD22758C}"/>
+              </a:ext>
+            </a:extLst>
+          </p:cNvPr>
+          <p:cNvSpPr txBox="1"/>
+          <p:nvPr/>
+        </p:nvSpPr>
+        <p:spPr>
+          <a:xfrm>
+            <a:off x="5530850" y="2514600"/>
+            <a:ext cx="1263650" cy="317500"/>
+          </a:xfrm>
+          <a:prstGeom prst="rect">
+            <a:avLst/>
+          </a:prstGeom>
+          <a:solidFill>
+            <a:srgbClr val="FFFF00"/>
+          </a:solidFill>
+        </p:spPr>
+        <p:txBody>
+          <a:bodyPr wrap="square" rtlCol="0">
+            <a:spAutoFit/>
+          </a:bodyPr>
+          <a:lstStyle/>
+          <a:p>
+            <a:pPr algn="ctr"/>
+            <a:r>
+              <a:rPr lang="en-US" dirty="0"/>
+              <a:t>Owner</a:t>
+            </a:r>
+          </a:p>
+        </p:txBody>
+      </p:sp>
+      <p:cxnSp>
+        <p:nvCxnSpPr>
+          <p:cNvPr id="17" name="Connector: Curved 16">
+            <a:extLst>
+              <a:ext uri="{FF2B5EF4-FFF2-40B4-BE49-F238E27FC236}">
+                <a16:creationId xmlns:a16="http://schemas.microsoft.com/office/drawing/2014/main" id="{95D766F0-BBD7-4B1F-0190-E3E48CBE5234}"/>
+              </a:ext>
+            </a:extLst>
+          </p:cNvPr>
+          <p:cNvCxnSpPr>
+            <a:stCxn id="15" idx="2"/>
+            <a:endCxn id="14" idx="0"/>
+          </p:cNvCxnSpPr>
+          <p:nvPr/>
+        </p:nvCxnSpPr>
+        <p:spPr>
+          <a:xfrm rot="5400000">
+            <a:off x="5810250" y="3159125"/>
+            <a:ext cx="679450" cy="25400"/>
+          </a:xfrm>
+          <a:prstGeom prst="curvedConnector3">
+            <a:avLst/>
+          </a:prstGeom>
+          <a:ln>
+            <a:tailEnd type="triangle"/>
+          </a:ln>
+        </p:spPr>
+        <p:style>
+          <a:lnRef idx="1">
+            <a:schemeClr val="accent1"/>
+          </a:lnRef>
+          <a:fillRef idx="0">
+            <a:schemeClr val="accent1"/>
+          </a:fillRef>
+          <a:effectRef idx="0">
+            <a:schemeClr val="accent1"/>
+          </a:effectRef>
+          <a:fontRef idx="minor">
+            <a:schemeClr val="tx1"/>
+          </a:fontRef>
+        </p:style>
+      </p:cxnSp>
+      <p:sp>
+        <p:nvSpPr>
+          <p:cNvPr id="18" name="Rectangle: Rounded Corners 17">
+            <a:extLst>
+              <a:ext uri="{FF2B5EF4-FFF2-40B4-BE49-F238E27FC236}">
+                <a16:creationId xmlns:a16="http://schemas.microsoft.com/office/drawing/2014/main" id="{1DD577F7-547A-220B-83A8-E1B6F70A58C6}"/>
+              </a:ext>
+            </a:extLst>
+          </p:cNvPr>
+          <p:cNvSpPr/>
+          <p:nvPr/>
+        </p:nvSpPr>
+        <p:spPr>
+          <a:xfrm>
+            <a:off x="7315200" y="3568700"/>
+            <a:ext cx="514350" cy="222250"/>
+          </a:xfrm>
+          <a:prstGeom prst="roundRect">
+            <a:avLst/>
+          </a:prstGeom>
+          <a:noFill/>
+        </p:spPr>
+        <p:style>
+          <a:lnRef idx="2">
+            <a:schemeClr val="accent1">
+              <a:shade val="15000"/>
+            </a:schemeClr>
+          </a:lnRef>
+          <a:fillRef idx="1">
+            <a:schemeClr val="accent1"/>
+          </a:fillRef>
+          <a:effectRef idx="0">
+            <a:schemeClr val="accent1"/>
+          </a:effectRef>
+          <a:fontRef idx="minor">
+            <a:schemeClr val="lt1"/>
+          </a:fontRef>
+        </p:style>
+        <p:txBody>
+          <a:bodyPr rtlCol="0" anchor="ctr"/>
+          <a:lstStyle/>
+          <a:p>
+            <a:pPr algn="ctr"/>
+            <a:endParaRPr lang="en-US"/>
+          </a:p>
+        </p:txBody>
+      </p:sp>
+      <p:sp>
+        <p:nvSpPr>
+          <p:cNvPr id="19" name="TextBox 18">
+            <a:extLst>
+              <a:ext uri="{FF2B5EF4-FFF2-40B4-BE49-F238E27FC236}">
+                <a16:creationId xmlns:a16="http://schemas.microsoft.com/office/drawing/2014/main" id="{74ED9FB4-D756-3B09-242A-65E8E5902998}"/>
+              </a:ext>
+            </a:extLst>
+          </p:cNvPr>
+          <p:cNvSpPr txBox="1"/>
+          <p:nvPr/>
+        </p:nvSpPr>
+        <p:spPr>
+          <a:xfrm>
+            <a:off x="8083550" y="2286000"/>
+            <a:ext cx="1009650" cy="307777"/>
+          </a:xfrm>
+          <a:prstGeom prst="rect">
+            <a:avLst/>
+          </a:prstGeom>
+          <a:solidFill>
+            <a:srgbClr val="FFFF00"/>
+          </a:solidFill>
+        </p:spPr>
+        <p:txBody>
+          <a:bodyPr wrap="square" rtlCol="0">
+            <a:spAutoFit/>
+          </a:bodyPr>
+          <a:lstStyle/>
+          <a:p>
+            <a:pPr algn="ctr"/>
+            <a:r>
+              <a:rPr lang="en-US" dirty="0" err="1"/>
+              <a:t>CreatedAt</a:t>
+            </a:r>
+            <a:endParaRPr lang="en-US" dirty="0"/>
+          </a:p>
+        </p:txBody>
+      </p:sp>
+      <p:cxnSp>
+        <p:nvCxnSpPr>
+          <p:cNvPr id="21" name="Connector: Curved 20">
+            <a:extLst>
+              <a:ext uri="{FF2B5EF4-FFF2-40B4-BE49-F238E27FC236}">
+                <a16:creationId xmlns:a16="http://schemas.microsoft.com/office/drawing/2014/main" id="{950057A4-90A6-0D1F-84D2-B0ECB5AD50CC}"/>
+              </a:ext>
+            </a:extLst>
+          </p:cNvPr>
+          <p:cNvCxnSpPr>
+            <a:endCxn id="18" idx="0"/>
+          </p:cNvCxnSpPr>
+          <p:nvPr/>
+        </p:nvCxnSpPr>
+        <p:spPr>
+          <a:xfrm rot="10800000" flipV="1">
+            <a:off x="7572376" y="2603500"/>
+            <a:ext cx="1025525" cy="965200"/>
+          </a:xfrm>
+          <a:prstGeom prst="curvedConnector2">
+            <a:avLst/>
+          </a:prstGeom>
+          <a:ln>
+            <a:tailEnd type="triangle"/>
+          </a:ln>
+        </p:spPr>
+        <p:style>
+          <a:lnRef idx="1">
+            <a:schemeClr val="accent1"/>
+          </a:lnRef>
+          <a:fillRef idx="0">
+            <a:schemeClr val="accent1"/>
+          </a:fillRef>
+          <a:effectRef idx="0">
+            <a:schemeClr val="accent1"/>
+          </a:effectRef>
+          <a:fontRef idx="minor">
+            <a:schemeClr val="tx1"/>
+          </a:fontRef>
+        </p:style>
+      </p:cxnSp>
+      <p:sp>
+        <p:nvSpPr>
+          <p:cNvPr id="22" name="Rectangle: Rounded Corners 21">
+            <a:extLst>
+              <a:ext uri="{FF2B5EF4-FFF2-40B4-BE49-F238E27FC236}">
+                <a16:creationId xmlns:a16="http://schemas.microsoft.com/office/drawing/2014/main" id="{2C8F4144-1894-75AD-ADB2-F0AA971D39E2}"/>
+              </a:ext>
+            </a:extLst>
+          </p:cNvPr>
+          <p:cNvSpPr/>
+          <p:nvPr/>
+        </p:nvSpPr>
+        <p:spPr>
+          <a:xfrm>
+            <a:off x="9290050" y="3511550"/>
+            <a:ext cx="730250" cy="309861"/>
+          </a:xfrm>
+          <a:prstGeom prst="roundRect">
+            <a:avLst/>
+          </a:prstGeom>
+          <a:noFill/>
+        </p:spPr>
+        <p:style>
+          <a:lnRef idx="2">
+            <a:schemeClr val="accent1">
+              <a:shade val="15000"/>
+            </a:schemeClr>
+          </a:lnRef>
+          <a:fillRef idx="1">
+            <a:schemeClr val="accent1"/>
+          </a:fillRef>
+          <a:effectRef idx="0">
+            <a:schemeClr val="accent1"/>
+          </a:effectRef>
+          <a:fontRef idx="minor">
+            <a:schemeClr val="lt1"/>
+          </a:fontRef>
+        </p:style>
+        <p:txBody>
+          <a:bodyPr rtlCol="0" anchor="ctr"/>
+          <a:lstStyle/>
+          <a:p>
+            <a:pPr algn="ctr"/>
+            <a:endParaRPr lang="en-US"/>
+          </a:p>
+        </p:txBody>
+      </p:sp>
+      <p:sp>
+        <p:nvSpPr>
+          <p:cNvPr id="23" name="TextBox 22">
+            <a:extLst>
+              <a:ext uri="{FF2B5EF4-FFF2-40B4-BE49-F238E27FC236}">
+                <a16:creationId xmlns:a16="http://schemas.microsoft.com/office/drawing/2014/main" id="{CA2EFE13-6DCB-1D30-8E50-F83B6B7987F4}"/>
+              </a:ext>
+            </a:extLst>
+          </p:cNvPr>
+          <p:cNvSpPr txBox="1"/>
+          <p:nvPr/>
+        </p:nvSpPr>
+        <p:spPr>
+          <a:xfrm>
+            <a:off x="9290050" y="2012950"/>
+            <a:ext cx="1155700" cy="307777"/>
+          </a:xfrm>
+          <a:prstGeom prst="rect">
+            <a:avLst/>
+          </a:prstGeom>
+          <a:solidFill>
+            <a:srgbClr val="FFFF00"/>
+          </a:solidFill>
+        </p:spPr>
+        <p:txBody>
+          <a:bodyPr wrap="square" rtlCol="0">
+            <a:spAutoFit/>
+          </a:bodyPr>
+          <a:lstStyle/>
+          <a:p>
+            <a:pPr algn="ctr"/>
+            <a:r>
+              <a:rPr lang="en-US" dirty="0"/>
+              <a:t>Location</a:t>
+            </a:r>
+          </a:p>
+        </p:txBody>
+      </p:sp>
+      <p:cxnSp>
+        <p:nvCxnSpPr>
+          <p:cNvPr id="25" name="Connector: Curved 24">
+            <a:extLst>
+              <a:ext uri="{FF2B5EF4-FFF2-40B4-BE49-F238E27FC236}">
+                <a16:creationId xmlns:a16="http://schemas.microsoft.com/office/drawing/2014/main" id="{E51A8FAA-D7D8-FB6D-30E6-86364072DDFF}"/>
+              </a:ext>
+            </a:extLst>
+          </p:cNvPr>
+          <p:cNvCxnSpPr>
+            <a:stCxn id="23" idx="2"/>
+            <a:endCxn id="22" idx="0"/>
+          </p:cNvCxnSpPr>
+          <p:nvPr/>
+        </p:nvCxnSpPr>
+        <p:spPr>
+          <a:xfrm rot="5400000">
+            <a:off x="9166127" y="2809776"/>
+            <a:ext cx="1190823" cy="212725"/>
+          </a:xfrm>
+          <a:prstGeom prst="curvedConnector3">
             <a:avLst/>
           </a:prstGeom>
           <a:ln>

</xml_diff>

<commit_message>
create Google Drive Presentation
</commit_message>
<xml_diff>
--- a/GoogleDriveScriptData/GoogleDriveQuery.pptx
+++ b/GoogleDriveScriptData/GoogleDriveQuery.pptx
@@ -257,7 +257,7 @@
       <p15:sldGuideLst xmlns:p15="http://schemas.microsoft.com/office/powerpoint/2012/main"/>
     </p:ext>
     <p:ext uri="GoogleSlidesCustomDataVersion2">
-      <go:slidesCustomData xmlns:go="http://customooxmlschemas.google.com/" xmlns:ahyp="http://schemas.microsoft.com/office/drawing/2018/hyperlinkcolor" xmlns:p15="http://schemas.microsoft.com/office/powerpoint/2012/main" xmlns:p14="http://schemas.microsoft.com/office/powerpoint/2010/main" xmlns:com="http://schemas.openxmlformats.org/drawingml/2006/compatibility" xmlns:pvml="urn:schemas-microsoft-com:office:powerpoint" xmlns:v="urn:schemas-microsoft-com:vml" xmlns:o="urn:schemas-microsoft-com:office:office" xmlns:dgm="http://schemas.openxmlformats.org/drawingml/2006/diagram" xmlns:c="http://schemas.openxmlformats.org/drawingml/2006/chart" xmlns:mv="urn:schemas-microsoft-com:mac:vml" xmlns:mc="http://schemas.openxmlformats.org/markup-compatibility/2006" xmlns="" r:id="rId18" roundtripDataSignature="AMtx7mh/6DGsVLLJF0qk1udMsmQM7sPXaw=="/>
+      <go:slidesCustomData xmlns="" xmlns:mc="http://schemas.openxmlformats.org/markup-compatibility/2006" xmlns:mv="urn:schemas-microsoft-com:mac:vml" xmlns:c="http://schemas.openxmlformats.org/drawingml/2006/chart" xmlns:dgm="http://schemas.openxmlformats.org/drawingml/2006/diagram" xmlns:o="urn:schemas-microsoft-com:office:office" xmlns:v="urn:schemas-microsoft-com:vml" xmlns:pvml="urn:schemas-microsoft-com:office:powerpoint" xmlns:com="http://schemas.openxmlformats.org/drawingml/2006/compatibility" xmlns:p14="http://schemas.microsoft.com/office/powerpoint/2010/main" xmlns:p15="http://schemas.microsoft.com/office/powerpoint/2012/main" xmlns:ahyp="http://schemas.microsoft.com/office/drawing/2018/hyperlinkcolor" xmlns:go="http://customooxmlschemas.google.com/" r:id="rId18" roundtripDataSignature="AMtx7mh/6DGsVLLJF0qk1udMsmQM7sPXaw=="/>
     </p:ext>
   </p:extLst>
 </p:presentation>
@@ -12303,654 +12303,6 @@
           </a:prstGeom>
         </p:spPr>
       </p:pic>
-      <p:sp>
-        <p:nvSpPr>
-          <p:cNvPr id="6" name="Rectangle 5">
-            <a:extLst>
-              <a:ext uri="{FF2B5EF4-FFF2-40B4-BE49-F238E27FC236}">
-                <a16:creationId xmlns:a16="http://schemas.microsoft.com/office/drawing/2014/main" id="{5B457B37-EEFE-D23C-E5AC-DD78AB19AA11}"/>
-              </a:ext>
-            </a:extLst>
-          </p:cNvPr>
-          <p:cNvSpPr/>
-          <p:nvPr/>
-        </p:nvSpPr>
-        <p:spPr>
-          <a:xfrm>
-            <a:off x="2240280" y="1810512"/>
-            <a:ext cx="7662672" cy="4924124"/>
-          </a:xfrm>
-          <a:prstGeom prst="rect">
-            <a:avLst/>
-          </a:prstGeom>
-          <a:noFill/>
-        </p:spPr>
-        <p:style>
-          <a:lnRef idx="2">
-            <a:schemeClr val="accent1">
-              <a:shade val="15000"/>
-            </a:schemeClr>
-          </a:lnRef>
-          <a:fillRef idx="1">
-            <a:schemeClr val="accent1"/>
-          </a:fillRef>
-          <a:effectRef idx="0">
-            <a:schemeClr val="accent1"/>
-          </a:effectRef>
-          <a:fontRef idx="minor">
-            <a:schemeClr val="lt1"/>
-          </a:fontRef>
-        </p:style>
-        <p:txBody>
-          <a:bodyPr rtlCol="0" anchor="ctr"/>
-          <a:lstStyle/>
-          <a:p>
-            <a:pPr algn="ctr"/>
-            <a:endParaRPr lang="en-US"/>
-          </a:p>
-        </p:txBody>
-      </p:sp>
-      <p:sp>
-        <p:nvSpPr>
-          <p:cNvPr id="7" name="TextBox 6">
-            <a:extLst>
-              <a:ext uri="{FF2B5EF4-FFF2-40B4-BE49-F238E27FC236}">
-                <a16:creationId xmlns:a16="http://schemas.microsoft.com/office/drawing/2014/main" id="{BAAB8C41-0538-308E-05CF-71A04B33BE39}"/>
-              </a:ext>
-            </a:extLst>
-          </p:cNvPr>
-          <p:cNvSpPr txBox="1"/>
-          <p:nvPr/>
-        </p:nvSpPr>
-        <p:spPr>
-          <a:xfrm>
-            <a:off x="173736" y="850392"/>
-            <a:ext cx="2642616" cy="307777"/>
-          </a:xfrm>
-          <a:prstGeom prst="rect">
-            <a:avLst/>
-          </a:prstGeom>
-          <a:solidFill>
-            <a:srgbClr val="FFFF00"/>
-          </a:solidFill>
-        </p:spPr>
-        <p:txBody>
-          <a:bodyPr wrap="square" rtlCol="0">
-            <a:spAutoFit/>
-          </a:bodyPr>
-          <a:lstStyle/>
-          <a:p>
-            <a:r>
-              <a:rPr lang="en-US" dirty="0"/>
-              <a:t>Select </a:t>
-            </a:r>
-            <a:r>
-              <a:rPr lang="en-US" dirty="0" err="1"/>
-              <a:t>GoogleDrive’s</a:t>
-            </a:r>
-            <a:r>
-              <a:rPr lang="en-US" dirty="0"/>
-              <a:t> Products</a:t>
-            </a:r>
-          </a:p>
-        </p:txBody>
-      </p:sp>
-      <p:cxnSp>
-        <p:nvCxnSpPr>
-          <p:cNvPr id="9" name="Straight Arrow Connector 8">
-            <a:extLst>
-              <a:ext uri="{FF2B5EF4-FFF2-40B4-BE49-F238E27FC236}">
-                <a16:creationId xmlns:a16="http://schemas.microsoft.com/office/drawing/2014/main" id="{79A44D3A-11E4-9B99-5464-A041D510E8DD}"/>
-              </a:ext>
-            </a:extLst>
-          </p:cNvPr>
-          <p:cNvCxnSpPr>
-            <a:stCxn id="7" idx="2"/>
-            <a:endCxn id="6" idx="1"/>
-          </p:cNvCxnSpPr>
-          <p:nvPr/>
-        </p:nvCxnSpPr>
-        <p:spPr>
-          <a:xfrm>
-            <a:off x="1495044" y="1158169"/>
-            <a:ext cx="745236" cy="3114405"/>
-          </a:xfrm>
-          <a:prstGeom prst="straightConnector1">
-            <a:avLst/>
-          </a:prstGeom>
-          <a:ln>
-            <a:tailEnd type="triangle"/>
-          </a:ln>
-        </p:spPr>
-        <p:style>
-          <a:lnRef idx="2">
-            <a:schemeClr val="accent4"/>
-          </a:lnRef>
-          <a:fillRef idx="0">
-            <a:schemeClr val="accent4"/>
-          </a:fillRef>
-          <a:effectRef idx="1">
-            <a:schemeClr val="accent4"/>
-          </a:effectRef>
-          <a:fontRef idx="minor">
-            <a:schemeClr val="tx1"/>
-          </a:fontRef>
-        </p:style>
-      </p:cxnSp>
-      <p:sp>
-        <p:nvSpPr>
-          <p:cNvPr id="11" name="Rectangle 10">
-            <a:extLst>
-              <a:ext uri="{FF2B5EF4-FFF2-40B4-BE49-F238E27FC236}">
-                <a16:creationId xmlns:a16="http://schemas.microsoft.com/office/drawing/2014/main" id="{2FBAA1DA-82EB-35CA-60F7-3F3F6FC2CA9C}"/>
-              </a:ext>
-            </a:extLst>
-          </p:cNvPr>
-          <p:cNvSpPr/>
-          <p:nvPr/>
-        </p:nvSpPr>
-        <p:spPr>
-          <a:xfrm>
-            <a:off x="4142232" y="960120"/>
-            <a:ext cx="4169664" cy="850392"/>
-          </a:xfrm>
-          <a:prstGeom prst="rect">
-            <a:avLst/>
-          </a:prstGeom>
-          <a:noFill/>
-        </p:spPr>
-        <p:style>
-          <a:lnRef idx="2">
-            <a:schemeClr val="accent1">
-              <a:shade val="15000"/>
-            </a:schemeClr>
-          </a:lnRef>
-          <a:fillRef idx="1">
-            <a:schemeClr val="accent1"/>
-          </a:fillRef>
-          <a:effectRef idx="0">
-            <a:schemeClr val="accent1"/>
-          </a:effectRef>
-          <a:fontRef idx="minor">
-            <a:schemeClr val="lt1"/>
-          </a:fontRef>
-        </p:style>
-        <p:txBody>
-          <a:bodyPr rtlCol="0" anchor="ctr"/>
-          <a:lstStyle/>
-          <a:p>
-            <a:pPr algn="ctr"/>
-            <a:endParaRPr lang="en-US"/>
-          </a:p>
-        </p:txBody>
-      </p:sp>
-      <p:sp>
-        <p:nvSpPr>
-          <p:cNvPr id="16" name="TextBox 15">
-            <a:extLst>
-              <a:ext uri="{FF2B5EF4-FFF2-40B4-BE49-F238E27FC236}">
-                <a16:creationId xmlns:a16="http://schemas.microsoft.com/office/drawing/2014/main" id="{73F8F969-1F1E-411C-DC0F-082019E3C885}"/>
-              </a:ext>
-            </a:extLst>
-          </p:cNvPr>
-          <p:cNvSpPr txBox="1"/>
-          <p:nvPr/>
-        </p:nvSpPr>
-        <p:spPr>
-          <a:xfrm>
-            <a:off x="8659368" y="365760"/>
-            <a:ext cx="3081528" cy="307777"/>
-          </a:xfrm>
-          <a:prstGeom prst="rect">
-            <a:avLst/>
-          </a:prstGeom>
-          <a:solidFill>
-            <a:srgbClr val="FFFF00"/>
-          </a:solidFill>
-        </p:spPr>
-        <p:txBody>
-          <a:bodyPr wrap="square" rtlCol="0">
-            <a:spAutoFit/>
-          </a:bodyPr>
-          <a:lstStyle/>
-          <a:p>
-            <a:r>
-              <a:rPr lang="en-US" dirty="0"/>
-              <a:t>Select Product of login User</a:t>
-            </a:r>
-          </a:p>
-        </p:txBody>
-      </p:sp>
-      <p:cxnSp>
-        <p:nvCxnSpPr>
-          <p:cNvPr id="20" name="Straight Arrow Connector 19">
-            <a:extLst>
-              <a:ext uri="{FF2B5EF4-FFF2-40B4-BE49-F238E27FC236}">
-                <a16:creationId xmlns:a16="http://schemas.microsoft.com/office/drawing/2014/main" id="{2BEECC1C-F876-8BBB-0A5D-2F5C69D192AC}"/>
-              </a:ext>
-            </a:extLst>
-          </p:cNvPr>
-          <p:cNvCxnSpPr/>
-          <p:nvPr/>
-        </p:nvCxnSpPr>
-        <p:spPr>
-          <a:xfrm flipH="1">
-            <a:off x="8311896" y="673537"/>
-            <a:ext cx="1883664" cy="698063"/>
-          </a:xfrm>
-          <a:prstGeom prst="straightConnector1">
-            <a:avLst/>
-          </a:prstGeom>
-          <a:ln>
-            <a:tailEnd type="triangle"/>
-          </a:ln>
-        </p:spPr>
-        <p:style>
-          <a:lnRef idx="1">
-            <a:schemeClr val="accent1"/>
-          </a:lnRef>
-          <a:fillRef idx="0">
-            <a:schemeClr val="accent1"/>
-          </a:fillRef>
-          <a:effectRef idx="0">
-            <a:schemeClr val="accent1"/>
-          </a:effectRef>
-          <a:fontRef idx="minor">
-            <a:schemeClr val="tx1"/>
-          </a:fontRef>
-        </p:style>
-      </p:cxnSp>
-      <p:sp>
-        <p:nvSpPr>
-          <p:cNvPr id="2" name="Rectangle: Rounded Corners 1">
-            <a:extLst>
-              <a:ext uri="{FF2B5EF4-FFF2-40B4-BE49-F238E27FC236}">
-                <a16:creationId xmlns:a16="http://schemas.microsoft.com/office/drawing/2014/main" id="{2F616863-2FEE-5B69-0383-50937CDDA8FE}"/>
-              </a:ext>
-            </a:extLst>
-          </p:cNvPr>
-          <p:cNvSpPr/>
-          <p:nvPr/>
-        </p:nvSpPr>
-        <p:spPr>
-          <a:xfrm>
-            <a:off x="2962275" y="2171700"/>
-            <a:ext cx="1476375" cy="609600"/>
-          </a:xfrm>
-          <a:prstGeom prst="roundRect">
-            <a:avLst/>
-          </a:prstGeom>
-          <a:noFill/>
-        </p:spPr>
-        <p:style>
-          <a:lnRef idx="2">
-            <a:schemeClr val="accent1">
-              <a:shade val="15000"/>
-            </a:schemeClr>
-          </a:lnRef>
-          <a:fillRef idx="1">
-            <a:schemeClr val="accent1"/>
-          </a:fillRef>
-          <a:effectRef idx="0">
-            <a:schemeClr val="accent1"/>
-          </a:effectRef>
-          <a:fontRef idx="minor">
-            <a:schemeClr val="lt1"/>
-          </a:fontRef>
-        </p:style>
-        <p:txBody>
-          <a:bodyPr rtlCol="0" anchor="ctr"/>
-          <a:lstStyle/>
-          <a:p>
-            <a:pPr algn="ctr"/>
-            <a:endParaRPr lang="en-US"/>
-          </a:p>
-        </p:txBody>
-      </p:sp>
-      <p:sp>
-        <p:nvSpPr>
-          <p:cNvPr id="3" name="TextBox 2">
-            <a:extLst>
-              <a:ext uri="{FF2B5EF4-FFF2-40B4-BE49-F238E27FC236}">
-                <a16:creationId xmlns:a16="http://schemas.microsoft.com/office/drawing/2014/main" id="{9FA41A8A-D11A-49F5-3546-A087DDB304F3}"/>
-              </a:ext>
-            </a:extLst>
-          </p:cNvPr>
-          <p:cNvSpPr txBox="1"/>
-          <p:nvPr/>
-        </p:nvSpPr>
-        <p:spPr>
-          <a:xfrm>
-            <a:off x="1566230" y="219075"/>
-            <a:ext cx="1966403" cy="307777"/>
-          </a:xfrm>
-          <a:prstGeom prst="rect">
-            <a:avLst/>
-          </a:prstGeom>
-          <a:solidFill>
-            <a:srgbClr val="FFFF00"/>
-          </a:solidFill>
-        </p:spPr>
-        <p:txBody>
-          <a:bodyPr wrap="square" rtlCol="0">
-            <a:spAutoFit/>
-          </a:bodyPr>
-          <a:lstStyle/>
-          <a:p>
-            <a:pPr algn="ctr"/>
-            <a:r>
-              <a:rPr lang="en-US" dirty="0"/>
-              <a:t>Product Item name</a:t>
-            </a:r>
-          </a:p>
-        </p:txBody>
-      </p:sp>
-      <p:cxnSp>
-        <p:nvCxnSpPr>
-          <p:cNvPr id="8" name="Connector: Curved 7">
-            <a:extLst>
-              <a:ext uri="{FF2B5EF4-FFF2-40B4-BE49-F238E27FC236}">
-                <a16:creationId xmlns:a16="http://schemas.microsoft.com/office/drawing/2014/main" id="{A6B832A4-1CB6-31E0-FE58-05E105E9D292}"/>
-              </a:ext>
-            </a:extLst>
-          </p:cNvPr>
-          <p:cNvCxnSpPr>
-            <a:endCxn id="2" idx="0"/>
-          </p:cNvCxnSpPr>
-          <p:nvPr/>
-        </p:nvCxnSpPr>
-        <p:spPr>
-          <a:xfrm rot="16200000" flipH="1">
-            <a:off x="2294632" y="765869"/>
-            <a:ext cx="1644848" cy="1166813"/>
-          </a:xfrm>
-          <a:prstGeom prst="curvedConnector3">
-            <a:avLst/>
-          </a:prstGeom>
-          <a:ln>
-            <a:tailEnd type="triangle"/>
-          </a:ln>
-        </p:spPr>
-        <p:style>
-          <a:lnRef idx="2">
-            <a:schemeClr val="dk1"/>
-          </a:lnRef>
-          <a:fillRef idx="0">
-            <a:schemeClr val="dk1"/>
-          </a:fillRef>
-          <a:effectRef idx="1">
-            <a:schemeClr val="dk1"/>
-          </a:effectRef>
-          <a:fontRef idx="minor">
-            <a:schemeClr val="tx1"/>
-          </a:fontRef>
-        </p:style>
-      </p:cxnSp>
-      <p:sp>
-        <p:nvSpPr>
-          <p:cNvPr id="10" name="Rectangle: Rounded Corners 9">
-            <a:extLst>
-              <a:ext uri="{FF2B5EF4-FFF2-40B4-BE49-F238E27FC236}">
-                <a16:creationId xmlns:a16="http://schemas.microsoft.com/office/drawing/2014/main" id="{B02A6FE5-C0F7-3AE8-A35A-E1214799D6AD}"/>
-              </a:ext>
-            </a:extLst>
-          </p:cNvPr>
-          <p:cNvSpPr/>
-          <p:nvPr/>
-        </p:nvSpPr>
-        <p:spPr>
-          <a:xfrm>
-            <a:off x="2816352" y="2781300"/>
-            <a:ext cx="1869948" cy="1077549"/>
-          </a:xfrm>
-          <a:prstGeom prst="roundRect">
-            <a:avLst/>
-          </a:prstGeom>
-          <a:noFill/>
-          <a:ln>
-            <a:solidFill>
-              <a:srgbClr val="FFFF00"/>
-            </a:solidFill>
-          </a:ln>
-        </p:spPr>
-        <p:style>
-          <a:lnRef idx="2">
-            <a:schemeClr val="accent1">
-              <a:shade val="15000"/>
-            </a:schemeClr>
-          </a:lnRef>
-          <a:fillRef idx="1">
-            <a:schemeClr val="accent1"/>
-          </a:fillRef>
-          <a:effectRef idx="0">
-            <a:schemeClr val="accent1"/>
-          </a:effectRef>
-          <a:fontRef idx="minor">
-            <a:schemeClr val="lt1"/>
-          </a:fontRef>
-        </p:style>
-        <p:txBody>
-          <a:bodyPr rtlCol="0" anchor="ctr"/>
-          <a:lstStyle/>
-          <a:p>
-            <a:pPr algn="ctr"/>
-            <a:endParaRPr lang="en-US"/>
-          </a:p>
-        </p:txBody>
-      </p:sp>
-      <p:sp>
-        <p:nvSpPr>
-          <p:cNvPr id="12" name="TextBox 11">
-            <a:extLst>
-              <a:ext uri="{FF2B5EF4-FFF2-40B4-BE49-F238E27FC236}">
-                <a16:creationId xmlns:a16="http://schemas.microsoft.com/office/drawing/2014/main" id="{8F3828A1-FBB8-B7F8-98D9-124527F68941}"/>
-              </a:ext>
-            </a:extLst>
-          </p:cNvPr>
-          <p:cNvSpPr txBox="1"/>
-          <p:nvPr/>
-        </p:nvSpPr>
-        <p:spPr>
-          <a:xfrm>
-            <a:off x="269146" y="3275110"/>
-            <a:ext cx="1201675" cy="307777"/>
-          </a:xfrm>
-          <a:prstGeom prst="rect">
-            <a:avLst/>
-          </a:prstGeom>
-          <a:solidFill>
-            <a:srgbClr val="FFFF00"/>
-          </a:solidFill>
-        </p:spPr>
-        <p:txBody>
-          <a:bodyPr wrap="square" rtlCol="0">
-            <a:spAutoFit/>
-          </a:bodyPr>
-          <a:lstStyle/>
-          <a:p>
-            <a:pPr algn="ctr"/>
-            <a:r>
-              <a:rPr lang="en-US" dirty="0"/>
-              <a:t>Promotion</a:t>
-            </a:r>
-          </a:p>
-        </p:txBody>
-      </p:sp>
-      <p:cxnSp>
-        <p:nvCxnSpPr>
-          <p:cNvPr id="14" name="Connector: Curved 13">
-            <a:extLst>
-              <a:ext uri="{FF2B5EF4-FFF2-40B4-BE49-F238E27FC236}">
-                <a16:creationId xmlns:a16="http://schemas.microsoft.com/office/drawing/2014/main" id="{83637DC7-5C73-ACDE-F90F-CDA37B4FC50F}"/>
-              </a:ext>
-            </a:extLst>
-          </p:cNvPr>
-          <p:cNvCxnSpPr>
-            <a:cxnSpLocks/>
-            <a:stCxn id="12" idx="3"/>
-            <a:endCxn id="10" idx="1"/>
-          </p:cNvCxnSpPr>
-          <p:nvPr/>
-        </p:nvCxnSpPr>
-        <p:spPr>
-          <a:xfrm flipV="1">
-            <a:off x="1470821" y="3320075"/>
-            <a:ext cx="1345531" cy="108924"/>
-          </a:xfrm>
-          <a:prstGeom prst="curvedConnector3">
-            <a:avLst/>
-          </a:prstGeom>
-          <a:ln>
-            <a:tailEnd type="triangle"/>
-          </a:ln>
-        </p:spPr>
-        <p:style>
-          <a:lnRef idx="1">
-            <a:schemeClr val="accent1"/>
-          </a:lnRef>
-          <a:fillRef idx="0">
-            <a:schemeClr val="accent1"/>
-          </a:fillRef>
-          <a:effectRef idx="0">
-            <a:schemeClr val="accent1"/>
-          </a:effectRef>
-          <a:fontRef idx="minor">
-            <a:schemeClr val="tx1"/>
-          </a:fontRef>
-        </p:style>
-      </p:cxnSp>
-      <p:sp>
-        <p:nvSpPr>
-          <p:cNvPr id="21" name="Rectangle: Rounded Corners 20">
-            <a:extLst>
-              <a:ext uri="{FF2B5EF4-FFF2-40B4-BE49-F238E27FC236}">
-                <a16:creationId xmlns:a16="http://schemas.microsoft.com/office/drawing/2014/main" id="{71789F54-E19F-E8E2-637B-36D6811CBB15}"/>
-              </a:ext>
-            </a:extLst>
-          </p:cNvPr>
-          <p:cNvSpPr/>
-          <p:nvPr/>
-        </p:nvSpPr>
-        <p:spPr>
-          <a:xfrm>
-            <a:off x="2886075" y="3858849"/>
-            <a:ext cx="1676400" cy="413725"/>
-          </a:xfrm>
-          <a:prstGeom prst="roundRect">
-            <a:avLst/>
-          </a:prstGeom>
-          <a:noFill/>
-          <a:ln>
-            <a:solidFill>
-              <a:srgbClr val="FF0000"/>
-            </a:solidFill>
-          </a:ln>
-        </p:spPr>
-        <p:style>
-          <a:lnRef idx="2">
-            <a:schemeClr val="accent1">
-              <a:shade val="15000"/>
-            </a:schemeClr>
-          </a:lnRef>
-          <a:fillRef idx="1">
-            <a:schemeClr val="accent1"/>
-          </a:fillRef>
-          <a:effectRef idx="0">
-            <a:schemeClr val="accent1"/>
-          </a:effectRef>
-          <a:fontRef idx="minor">
-            <a:schemeClr val="lt1"/>
-          </a:fontRef>
-        </p:style>
-        <p:txBody>
-          <a:bodyPr rtlCol="0" anchor="ctr"/>
-          <a:lstStyle/>
-          <a:p>
-            <a:pPr algn="ctr"/>
-            <a:endParaRPr lang="en-US"/>
-          </a:p>
-        </p:txBody>
-      </p:sp>
-      <p:sp>
-        <p:nvSpPr>
-          <p:cNvPr id="22" name="TextBox 21">
-            <a:extLst>
-              <a:ext uri="{FF2B5EF4-FFF2-40B4-BE49-F238E27FC236}">
-                <a16:creationId xmlns:a16="http://schemas.microsoft.com/office/drawing/2014/main" id="{24744F96-C164-C167-7BF5-7C4D8663C46A}"/>
-              </a:ext>
-            </a:extLst>
-          </p:cNvPr>
-          <p:cNvSpPr txBox="1"/>
-          <p:nvPr/>
-        </p:nvSpPr>
-        <p:spPr>
-          <a:xfrm>
-            <a:off x="409575" y="3858849"/>
-            <a:ext cx="666750" cy="307777"/>
-          </a:xfrm>
-          <a:prstGeom prst="rect">
-            <a:avLst/>
-          </a:prstGeom>
-          <a:solidFill>
-            <a:srgbClr val="FFFF00"/>
-          </a:solidFill>
-        </p:spPr>
-        <p:txBody>
-          <a:bodyPr wrap="square" rtlCol="0">
-            <a:spAutoFit/>
-          </a:bodyPr>
-          <a:lstStyle/>
-          <a:p>
-            <a:pPr algn="ctr"/>
-            <a:r>
-              <a:rPr lang="en-US" dirty="0"/>
-              <a:t>Cost</a:t>
-            </a:r>
-          </a:p>
-        </p:txBody>
-      </p:sp>
-      <p:cxnSp>
-        <p:nvCxnSpPr>
-          <p:cNvPr id="24" name="Connector: Curved 23">
-            <a:extLst>
-              <a:ext uri="{FF2B5EF4-FFF2-40B4-BE49-F238E27FC236}">
-                <a16:creationId xmlns:a16="http://schemas.microsoft.com/office/drawing/2014/main" id="{E23974AC-51AB-D95D-FF56-96D50AD8B038}"/>
-              </a:ext>
-            </a:extLst>
-          </p:cNvPr>
-          <p:cNvCxnSpPr>
-            <a:stCxn id="22" idx="3"/>
-            <a:endCxn id="21" idx="1"/>
-          </p:cNvCxnSpPr>
-          <p:nvPr/>
-        </p:nvCxnSpPr>
-        <p:spPr>
-          <a:xfrm>
-            <a:off x="1076325" y="4012738"/>
-            <a:ext cx="1809750" cy="52974"/>
-          </a:xfrm>
-          <a:prstGeom prst="curvedConnector3">
-            <a:avLst/>
-          </a:prstGeom>
-          <a:ln>
-            <a:tailEnd type="triangle"/>
-          </a:ln>
-        </p:spPr>
-        <p:style>
-          <a:lnRef idx="1">
-            <a:schemeClr val="accent1"/>
-          </a:lnRef>
-          <a:fillRef idx="0">
-            <a:schemeClr val="accent1"/>
-          </a:fillRef>
-          <a:effectRef idx="0">
-            <a:schemeClr val="accent1"/>
-          </a:effectRef>
-          <a:fontRef idx="minor">
-            <a:schemeClr val="tx1"/>
-          </a:fontRef>
-        </p:style>
-      </p:cxnSp>
     </p:spTree>
     <p:extLst>
       <p:ext uri="{BB962C8B-B14F-4D97-AF65-F5344CB8AC3E}">

</xml_diff>